<commit_message>
chg: Updated all targets in the TGT list with DPIs in OPAC.miz, updated target list, CombatFlite and "Notia as candidate for air attack" with the same information. Updated OPAC TGT effect with additional buildings that provide ruins (still lacking testing of how many explosives needed per building).
</commit_message>
<xml_diff>
--- a/INTEL/VID/WIP/INTREP VID OPAC-001 - Enemy Air Assets in Notia and Kambiland.pptx
+++ b/INTEL/VID/WIP/INTREP VID OPAC-001 - Enemy Air Assets in Notia and Kambiland.pptx
@@ -6405,7 +6405,7 @@
   </dgm:whole>
   <dgm:extLst>
     <a:ext uri="http://schemas.microsoft.com/office/drawing/2008/diagram">
-      <dsp:dataModelExt xmlns:dsp="http://schemas.microsoft.com/office/drawing/2008/diagram" xmlns="" relId="rId7" minVer="http://schemas.openxmlformats.org/drawingml/2006/diagram"/>
+      <dsp:dataModelExt xmlns="" xmlns:dsp="http://schemas.microsoft.com/office/drawing/2008/diagram" relId="rId7" minVer="http://schemas.openxmlformats.org/drawingml/2006/diagram"/>
     </a:ext>
   </dgm:extLst>
 </dgm:dataModel>
@@ -10018,7 +10018,7 @@
   </dgm:whole>
   <dgm:extLst>
     <a:ext uri="http://schemas.microsoft.com/office/drawing/2008/diagram">
-      <dsp:dataModelExt xmlns:dsp="http://schemas.microsoft.com/office/drawing/2008/diagram" xmlns="" relId="rId7" minVer="http://schemas.openxmlformats.org/drawingml/2006/diagram"/>
+      <dsp:dataModelExt xmlns="" xmlns:dsp="http://schemas.microsoft.com/office/drawing/2008/diagram" relId="rId7" minVer="http://schemas.openxmlformats.org/drawingml/2006/diagram"/>
     </a:ext>
   </dgm:extLst>
 </dgm:dataModel>
@@ -30475,7 +30475,7 @@
             <a:fld id="{40637A30-8EE1-4060-9976-8832FC89EE34}" type="datetimeFigureOut">
               <a:rPr lang="nb-NO" smtClean="0"/>
               <a:pPr/>
-              <a:t>14.11.2024</a:t>
+              <a:t>03.01.2025</a:t>
             </a:fld>
             <a:endParaRPr lang="nb-NO"/>
           </a:p>
@@ -34235,7 +34235,14 @@
                 <a:latin typeface="Arial Black" pitchFamily="34" charset="0"/>
                 <a:ea typeface="MS Mincho" pitchFamily="49" charset="-128"/>
               </a:rPr>
-              <a:t>INTREP VID-OPAR-001</a:t>
+              <a:t>INTREP </a:t>
+            </a:r>
+            <a:r>
+              <a:rPr lang="nb-NO" sz="2800" b="1" dirty="0" smtClean="0">
+                <a:latin typeface="Arial Black" pitchFamily="34" charset="0"/>
+                <a:ea typeface="MS Mincho" pitchFamily="49" charset="-128"/>
+              </a:rPr>
+              <a:t>VID-OPAC-001</a:t>
             </a:r>
             <a:endParaRPr lang="nb-NO" sz="2800" b="1" dirty="0">
               <a:latin typeface="MS Mincho" pitchFamily="49" charset="-128"/>

</xml_diff>

<commit_message>
chg: Added 4 targets (Air Division HQs) to OPAC.miz, JTL, OPAC DPIs for CF, updated introductionary brief, updated DPIs for target folder, continued work on OPAC_VID_INTREP-002 Notian Air Assets
</commit_message>
<xml_diff>
--- a/INTEL/VID/WIP/INTREP VID OPAC-001 - Enemy Air Assets in Notia and Kambiland.pptx
+++ b/INTEL/VID/WIP/INTREP VID OPAC-001 - Enemy Air Assets in Notia and Kambiland.pptx
@@ -5,7 +5,7 @@
     <p:sldMasterId id="2147483648" r:id="rId1"/>
   </p:sldMasterIdLst>
   <p:notesMasterIdLst>
-    <p:notesMasterId r:id="rId16"/>
+    <p:notesMasterId r:id="rId17"/>
   </p:notesMasterIdLst>
   <p:sldIdLst>
     <p:sldId id="257" r:id="rId2"/>
@@ -18,10 +18,11 @@
     <p:sldId id="382" r:id="rId9"/>
     <p:sldId id="377" r:id="rId10"/>
     <p:sldId id="362" r:id="rId11"/>
-    <p:sldId id="367" r:id="rId12"/>
-    <p:sldId id="375" r:id="rId13"/>
-    <p:sldId id="368" r:id="rId14"/>
-    <p:sldId id="365" r:id="rId15"/>
+    <p:sldId id="383" r:id="rId12"/>
+    <p:sldId id="367" r:id="rId13"/>
+    <p:sldId id="375" r:id="rId14"/>
+    <p:sldId id="368" r:id="rId15"/>
+    <p:sldId id="365" r:id="rId16"/>
   </p:sldIdLst>
   <p:sldSz cx="9144000" cy="5143500" type="screen16x9"/>
   <p:notesSz cx="6858000" cy="9144000"/>
@@ -6405,7 +6406,7 @@
   </dgm:whole>
   <dgm:extLst>
     <a:ext uri="http://schemas.microsoft.com/office/drawing/2008/diagram">
-      <dsp:dataModelExt xmlns="" xmlns:dsp="http://schemas.microsoft.com/office/drawing/2008/diagram" relId="rId7" minVer="http://schemas.openxmlformats.org/drawingml/2006/diagram"/>
+      <dsp:dataModelExt xmlns:dsp="http://schemas.microsoft.com/office/drawing/2008/diagram" xmlns="" relId="rId7" minVer="http://schemas.openxmlformats.org/drawingml/2006/diagram"/>
     </a:ext>
   </dgm:extLst>
 </dgm:dataModel>
@@ -10018,7 +10019,7 @@
   </dgm:whole>
   <dgm:extLst>
     <a:ext uri="http://schemas.microsoft.com/office/drawing/2008/diagram">
-      <dsp:dataModelExt xmlns="" xmlns:dsp="http://schemas.microsoft.com/office/drawing/2008/diagram" relId="rId7" minVer="http://schemas.openxmlformats.org/drawingml/2006/diagram"/>
+      <dsp:dataModelExt xmlns:dsp="http://schemas.microsoft.com/office/drawing/2008/diagram" xmlns="" relId="rId7" minVer="http://schemas.openxmlformats.org/drawingml/2006/diagram"/>
     </a:ext>
   </dgm:extLst>
 </dgm:dataModel>
@@ -10388,7 +10389,27 @@
               <a:latin typeface="Arial" pitchFamily="34" charset="0"/>
               <a:cs typeface="Arial" pitchFamily="34" charset="0"/>
             </a:rPr>
-            <a:t> Support Division</a:t>
+            <a:t> </a:t>
+          </a:r>
+          <a:r>
+            <a:rPr lang="en-US" sz="800" dirty="0" smtClean="0">
+              <a:solidFill>
+                <a:schemeClr val="tx1"/>
+              </a:solidFill>
+              <a:latin typeface="Arial" pitchFamily="34" charset="0"/>
+              <a:cs typeface="Arial" pitchFamily="34" charset="0"/>
+            </a:rPr>
+            <a:t>Air Support </a:t>
+          </a:r>
+          <a:r>
+            <a:rPr lang="en-US" sz="800" dirty="0" smtClean="0">
+              <a:solidFill>
+                <a:schemeClr val="tx1"/>
+              </a:solidFill>
+              <a:latin typeface="Arial" pitchFamily="34" charset="0"/>
+              <a:cs typeface="Arial" pitchFamily="34" charset="0"/>
+            </a:rPr>
+            <a:t>Division</a:t>
           </a:r>
         </a:p>
         <a:p>
@@ -30475,7 +30496,7 @@
             <a:fld id="{40637A30-8EE1-4060-9976-8832FC89EE34}" type="datetimeFigureOut">
               <a:rPr lang="nb-NO" smtClean="0"/>
               <a:pPr/>
-              <a:t>03.01.2025</a:t>
+              <a:t>07.01.2025</a:t>
             </a:fld>
             <a:endParaRPr lang="nb-NO"/>
           </a:p>
@@ -34235,14 +34256,7 @@
                 <a:latin typeface="Arial Black" pitchFamily="34" charset="0"/>
                 <a:ea typeface="MS Mincho" pitchFamily="49" charset="-128"/>
               </a:rPr>
-              <a:t>INTREP </a:t>
-            </a:r>
-            <a:r>
-              <a:rPr lang="nb-NO" sz="2800" b="1" dirty="0" smtClean="0">
-                <a:latin typeface="Arial Black" pitchFamily="34" charset="0"/>
-                <a:ea typeface="MS Mincho" pitchFamily="49" charset="-128"/>
-              </a:rPr>
-              <a:t>VID-OPAC-001</a:t>
+              <a:t>INTREP VID-OPAC-001</a:t>
             </a:r>
             <a:endParaRPr lang="nb-NO" sz="2800" b="1" dirty="0">
               <a:latin typeface="MS Mincho" pitchFamily="49" charset="-128"/>
@@ -35666,6 +35680,110 @@
       </p:grpSpPr>
       <p:sp>
         <p:nvSpPr>
+          <p:cNvPr id="26" name="TekstSylinder 25"/>
+          <p:cNvSpPr txBox="1"/>
+          <p:nvPr/>
+        </p:nvSpPr>
+        <p:spPr>
+          <a:xfrm>
+            <a:off x="6110139" y="658365"/>
+            <a:ext cx="3024336" cy="4071966"/>
+          </a:xfrm>
+          <a:prstGeom prst="rect">
+            <a:avLst/>
+          </a:prstGeom>
+          <a:solidFill>
+            <a:schemeClr val="accent1">
+              <a:lumMod val="20000"/>
+              <a:lumOff val="80000"/>
+            </a:schemeClr>
+          </a:solidFill>
+          <a:ln>
+            <a:solidFill>
+              <a:schemeClr val="tx1"/>
+            </a:solidFill>
+          </a:ln>
+        </p:spPr>
+        <p:txBody>
+          <a:bodyPr wrap="square" rtlCol="0">
+            <a:normAutofit/>
+          </a:bodyPr>
+          <a:lstStyle/>
+          <a:p>
+            <a:r>
+              <a:rPr lang="en-US" sz="1200" b="1" dirty="0" smtClean="0">
+                <a:latin typeface="Arial" pitchFamily="34" charset="0"/>
+                <a:cs typeface="Arial" pitchFamily="34" charset="0"/>
+              </a:rPr>
+              <a:t>Air operations: A-A / Air Defense</a:t>
+            </a:r>
+          </a:p>
+          <a:p>
+            <a:r>
+              <a:rPr lang="en-US" sz="1000" dirty="0" smtClean="0">
+                <a:latin typeface="Arial" pitchFamily="34" charset="0"/>
+                <a:cs typeface="Arial" pitchFamily="34" charset="0"/>
+              </a:rPr>
+              <a:t>The Syrian Air Force’s most important objective is to defend the Syrian territory and because of this part of the Syrian Air Force is tied into the Syrian Integrated Air Defense System (IADS). All interceptor squadrons are tied directly to the Air Defense, while the Fighter Squadrons rotate in taking turns flying Defensive Counter Air (DCA) missions in various parts of Syrian to ensure a high readiness of fighter aircrafts to support against any aggression toward Syrian territory. </a:t>
+            </a:r>
+          </a:p>
+          <a:p>
+            <a:endParaRPr lang="en-US" sz="1000" dirty="0" smtClean="0">
+              <a:latin typeface="Arial" pitchFamily="34" charset="0"/>
+              <a:cs typeface="Arial" pitchFamily="34" charset="0"/>
+            </a:endParaRPr>
+          </a:p>
+          <a:p>
+            <a:r>
+              <a:rPr lang="en-US" sz="1000" dirty="0" smtClean="0">
+                <a:latin typeface="Arial" pitchFamily="34" charset="0"/>
+                <a:cs typeface="Arial" pitchFamily="34" charset="0"/>
+              </a:rPr>
+              <a:t>DCA CAP operations is normally forward staged as part of the layered defense where CAP is first line of defense, second line of defense is interceptors </a:t>
+            </a:r>
+            <a:r>
+              <a:rPr lang="en-US" sz="1000" dirty="0" err="1" smtClean="0">
+                <a:latin typeface="Arial" pitchFamily="34" charset="0"/>
+                <a:cs typeface="Arial" pitchFamily="34" charset="0"/>
+              </a:rPr>
+              <a:t>beeing</a:t>
+            </a:r>
+            <a:r>
+              <a:rPr lang="en-US" sz="1000" dirty="0" smtClean="0">
+                <a:latin typeface="Arial" pitchFamily="34" charset="0"/>
+                <a:cs typeface="Arial" pitchFamily="34" charset="0"/>
+              </a:rPr>
+              <a:t> scrambled from airbases and the third line of defense is the IADS network.</a:t>
+            </a:r>
+          </a:p>
+          <a:p>
+            <a:endParaRPr lang="en-US" sz="1200" dirty="0" smtClean="0"/>
+          </a:p>
+          <a:p>
+            <a:endParaRPr lang="en-US" sz="1200" dirty="0" smtClean="0"/>
+          </a:p>
+          <a:p>
+            <a:endParaRPr lang="en-US" sz="1200" dirty="0" smtClean="0"/>
+          </a:p>
+          <a:p>
+            <a:endParaRPr lang="en-US" sz="1200" dirty="0" smtClean="0"/>
+          </a:p>
+          <a:p>
+            <a:endParaRPr lang="en-US" sz="1200" dirty="0" smtClean="0"/>
+          </a:p>
+          <a:p>
+            <a:endParaRPr lang="en-US" sz="1200" dirty="0" smtClean="0"/>
+          </a:p>
+          <a:p>
+            <a:endParaRPr lang="nb-NO" sz="1200" dirty="0" smtClean="0">
+              <a:latin typeface="Arial" pitchFamily="34" charset="0"/>
+              <a:cs typeface="Arial" pitchFamily="34" charset="0"/>
+            </a:endParaRPr>
+          </a:p>
+        </p:txBody>
+      </p:sp>
+      <p:sp>
+        <p:nvSpPr>
           <p:cNvPr id="2" name="Tittel 1"/>
           <p:cNvSpPr>
             <a:spLocks noGrp="1"/>
@@ -35681,7 +35799,7 @@
           <a:p>
             <a:r>
               <a:rPr lang="en-US" dirty="0" smtClean="0"/>
-              <a:t>Command and Control</a:t>
+              <a:t>Doctrine</a:t>
             </a:r>
             <a:endParaRPr lang="en-US" dirty="0"/>
           </a:p>
@@ -36319,8 +36437,8 @@
         </p:nvSpPr>
         <p:spPr>
           <a:xfrm>
-            <a:off x="142844" y="785800"/>
-            <a:ext cx="3214678" cy="4071966"/>
+            <a:off x="6921" y="656762"/>
+            <a:ext cx="3024336" cy="4071966"/>
           </a:xfrm>
           <a:prstGeom prst="rect">
             <a:avLst/>
@@ -36339,16 +36457,16 @@
         </p:spPr>
         <p:txBody>
           <a:bodyPr wrap="square" rtlCol="0">
-            <a:normAutofit fontScale="92500" lnSpcReduction="20000"/>
+            <a:normAutofit/>
           </a:bodyPr>
           <a:lstStyle/>
           <a:p>
             <a:r>
-              <a:rPr lang="en-US" sz="1000" b="1" dirty="0" smtClean="0">
+              <a:rPr lang="en-US" sz="1200" b="1" dirty="0" smtClean="0">
                 <a:latin typeface="Arial" pitchFamily="34" charset="0"/>
                 <a:cs typeface="Arial" pitchFamily="34" charset="0"/>
               </a:rPr>
-              <a:t>Syrian Air Force Headquarter</a:t>
+              <a:t>Air operations: General</a:t>
             </a:r>
           </a:p>
           <a:p>
@@ -36357,16 +36475,31 @@
                 <a:latin typeface="Arial" pitchFamily="34" charset="0"/>
                 <a:cs typeface="Arial" pitchFamily="34" charset="0"/>
               </a:rPr>
-              <a:t>- Work with long term plans, training, budgeting  and will have no effect on the short term.</a:t>
-            </a:r>
-          </a:p>
-          <a:p>
+              <a:t>The Syrian Air Force have two primary objectives: </a:t>
+            </a:r>
+          </a:p>
+          <a:p>
+            <a:pPr marL="228600" indent="-228600">
+              <a:buAutoNum type="arabicPeriod"/>
+            </a:pPr>
             <a:r>
               <a:rPr lang="en-US" sz="1000" dirty="0" smtClean="0">
                 <a:latin typeface="Arial" pitchFamily="34" charset="0"/>
                 <a:cs typeface="Arial" pitchFamily="34" charset="0"/>
               </a:rPr>
-              <a:t>- If destroyed will reduce ability to train new pilots, introduce new aircraft, weapons and systems.</a:t>
+              <a:t>Defend Syrian territory</a:t>
+            </a:r>
+          </a:p>
+          <a:p>
+            <a:pPr marL="228600" indent="-228600">
+              <a:buAutoNum type="arabicPeriod"/>
+            </a:pPr>
+            <a:r>
+              <a:rPr lang="en-US" sz="1000" dirty="0" smtClean="0">
+                <a:latin typeface="Arial" pitchFamily="34" charset="0"/>
+                <a:cs typeface="Arial" pitchFamily="34" charset="0"/>
+              </a:rPr>
+              <a:t>Project power to Syrian enemies</a:t>
             </a:r>
           </a:p>
           <a:p>
@@ -36377,37 +36510,25 @@
           </a:p>
           <a:p>
             <a:r>
-              <a:rPr lang="en-US" sz="1000" b="1" dirty="0" smtClean="0">
-                <a:latin typeface="Arial" pitchFamily="34" charset="0"/>
-                <a:cs typeface="Arial" pitchFamily="34" charset="0"/>
-              </a:rPr>
-              <a:t>Air Division Headquarter</a:t>
-            </a:r>
-          </a:p>
-          <a:p>
-            <a:pPr>
-              <a:buFontTx/>
-              <a:buChar char="-"/>
-            </a:pPr>
-            <a:r>
               <a:rPr lang="en-US" sz="1000" dirty="0" smtClean="0">
                 <a:latin typeface="Arial" pitchFamily="34" charset="0"/>
                 <a:cs typeface="Arial" pitchFamily="34" charset="0"/>
               </a:rPr>
-              <a:t>Plans and execute major Syrian air operations.</a:t>
-            </a:r>
-          </a:p>
-          <a:p>
-            <a:pPr>
-              <a:buFontTx/>
-              <a:buChar char="-"/>
-            </a:pPr>
+              <a:t>Syrian Air Force have a more centralized command and control than coalition </a:t>
+            </a:r>
+            <a:r>
+              <a:rPr lang="en-US" sz="1000" dirty="0" err="1" smtClean="0">
+                <a:latin typeface="Arial" pitchFamily="34" charset="0"/>
+                <a:cs typeface="Arial" pitchFamily="34" charset="0"/>
+              </a:rPr>
+              <a:t>airforces</a:t>
+            </a:r>
             <a:r>
               <a:rPr lang="en-US" sz="1000" dirty="0" smtClean="0">
                 <a:latin typeface="Arial" pitchFamily="34" charset="0"/>
                 <a:cs typeface="Arial" pitchFamily="34" charset="0"/>
               </a:rPr>
-              <a:t> If destroyed, the squadrons belonging to that division will not be able to participate in major air operations until a new division headquarter is operational .</a:t>
+              <a:t>. This means that Syrian air operations are more scheduled and will come in waves. The Syrian forces are not trained and have a level high enough for conducting decentralized COMAO (Combined Air Operations = package operations)</a:t>
             </a:r>
           </a:p>
           <a:p>
@@ -36418,37 +36539,39 @@
           </a:p>
           <a:p>
             <a:r>
-              <a:rPr lang="en-US" sz="1000" b="1" dirty="0" smtClean="0">
-                <a:latin typeface="Arial" pitchFamily="34" charset="0"/>
-                <a:cs typeface="Arial" pitchFamily="34" charset="0"/>
-              </a:rPr>
-              <a:t>Regiment Headquarter</a:t>
-            </a:r>
-          </a:p>
-          <a:p>
-            <a:pPr>
-              <a:buFontTx/>
-              <a:buChar char="-"/>
-            </a:pPr>
-            <a:r>
               <a:rPr lang="en-US" sz="1000" dirty="0" smtClean="0">
                 <a:latin typeface="Arial" pitchFamily="34" charset="0"/>
                 <a:cs typeface="Arial" pitchFamily="34" charset="0"/>
               </a:rPr>
-              <a:t>Plans and execute the missions for the squadrons in the Regiment on the short term.</a:t>
-            </a:r>
-          </a:p>
-          <a:p>
-            <a:pPr>
-              <a:buFontTx/>
-              <a:buChar char="-"/>
-            </a:pPr>
+              <a:t>Once a aircraft is airborne it is not </a:t>
+            </a:r>
+            <a:r>
+              <a:rPr lang="en-US" sz="1000" dirty="0" err="1" smtClean="0">
+                <a:latin typeface="Arial" pitchFamily="34" charset="0"/>
+                <a:cs typeface="Arial" pitchFamily="34" charset="0"/>
+              </a:rPr>
+              <a:t>beeing</a:t>
+            </a:r>
             <a:r>
               <a:rPr lang="en-US" sz="1000" dirty="0" smtClean="0">
                 <a:latin typeface="Arial" pitchFamily="34" charset="0"/>
                 <a:cs typeface="Arial" pitchFamily="34" charset="0"/>
               </a:rPr>
-              <a:t>If destroyed, it will reduce the squadrons ability to schedule missions, and thus lower amount of sorties will be available from the squadron.</a:t>
+              <a:t> controlled in air, and will execute its mission as briefed. The only exception is fighters and interceptors </a:t>
+            </a:r>
+            <a:r>
+              <a:rPr lang="en-US" sz="1000" dirty="0" err="1" smtClean="0">
+                <a:latin typeface="Arial" pitchFamily="34" charset="0"/>
+                <a:cs typeface="Arial" pitchFamily="34" charset="0"/>
+              </a:rPr>
+              <a:t>beeing</a:t>
+            </a:r>
+            <a:r>
+              <a:rPr lang="en-US" sz="1000" dirty="0" smtClean="0">
+                <a:latin typeface="Arial" pitchFamily="34" charset="0"/>
+                <a:cs typeface="Arial" pitchFamily="34" charset="0"/>
+              </a:rPr>
+              <a:t> controlled from GCI as part of the Syrian IADS.</a:t>
             </a:r>
           </a:p>
           <a:p>
@@ -36459,107 +36582,52 @@
           </a:p>
           <a:p>
             <a:r>
-              <a:rPr lang="en-US" sz="1000" b="1" dirty="0" smtClean="0">
-                <a:latin typeface="Arial" pitchFamily="34" charset="0"/>
-                <a:cs typeface="Arial" pitchFamily="34" charset="0"/>
-              </a:rPr>
-              <a:t>Ground Controlled Intercept (GCI)</a:t>
-            </a:r>
-          </a:p>
-          <a:p>
-            <a:pPr>
-              <a:buFontTx/>
-              <a:buChar char="-"/>
-            </a:pPr>
-            <a:r>
               <a:rPr lang="en-US" sz="1000" dirty="0" smtClean="0">
                 <a:latin typeface="Arial" pitchFamily="34" charset="0"/>
                 <a:cs typeface="Arial" pitchFamily="34" charset="0"/>
               </a:rPr>
-              <a:t>Normally located in a sector command center (SCC) as part of the Integrated Air Defense System (IADS).</a:t>
-            </a:r>
-          </a:p>
-          <a:p>
-            <a:pPr>
-              <a:buFontTx/>
-              <a:buChar char="-"/>
-            </a:pPr>
+              <a:t>In the case of a major Syrian air operation, expect A-A sweep to be sent in first, followed by A-G aircraft doing strikes.  701</a:t>
+            </a:r>
+            <a:r>
+              <a:rPr lang="en-US" sz="1000" baseline="30000" dirty="0" smtClean="0">
+                <a:latin typeface="Arial" pitchFamily="34" charset="0"/>
+                <a:cs typeface="Arial" pitchFamily="34" charset="0"/>
+              </a:rPr>
+              <a:t>st</a:t>
+            </a:r>
             <a:r>
               <a:rPr lang="en-US" sz="1000" dirty="0" smtClean="0">
                 <a:latin typeface="Arial" pitchFamily="34" charset="0"/>
                 <a:cs typeface="Arial" pitchFamily="34" charset="0"/>
               </a:rPr>
-              <a:t>GCI Supports the Syrian Air Defense with control of fighters and interceptors conducting Defensive Counter Air (DCA) operations. </a:t>
-            </a:r>
-          </a:p>
-          <a:p>
+              <a:t> and 702</a:t>
+            </a:r>
+            <a:r>
+              <a:rPr lang="en-US" sz="1000" baseline="30000" dirty="0" smtClean="0">
+                <a:latin typeface="Arial" pitchFamily="34" charset="0"/>
+                <a:cs typeface="Arial" pitchFamily="34" charset="0"/>
+              </a:rPr>
+              <a:t>nd</a:t>
+            </a:r>
             <a:r>
               <a:rPr lang="en-US" sz="1000" dirty="0" smtClean="0">
                 <a:latin typeface="Arial" pitchFamily="34" charset="0"/>
                 <a:cs typeface="Arial" pitchFamily="34" charset="0"/>
               </a:rPr>
-              <a:t>If destroyed:</a:t>
-            </a:r>
-          </a:p>
-          <a:p>
-            <a:r>
-              <a:rPr lang="en-US" sz="1000" dirty="0" smtClean="0">
-                <a:latin typeface="Arial" pitchFamily="34" charset="0"/>
-                <a:cs typeface="Arial" pitchFamily="34" charset="0"/>
-              </a:rPr>
-              <a:t>- May prevent scrambles of intercept aircraft</a:t>
-            </a:r>
-          </a:p>
-          <a:p>
-            <a:pPr>
-              <a:buFontTx/>
-              <a:buChar char="-"/>
-            </a:pPr>
-            <a:r>
-              <a:rPr lang="en-US" sz="1000" dirty="0" smtClean="0">
-                <a:latin typeface="Arial" pitchFamily="34" charset="0"/>
-                <a:cs typeface="Arial" pitchFamily="34" charset="0"/>
-              </a:rPr>
-              <a:t> May lead to intercept aircraft flying to wrong areas</a:t>
-            </a:r>
-          </a:p>
-          <a:p>
-            <a:pPr>
-              <a:buFontTx/>
-              <a:buChar char="-"/>
-            </a:pPr>
-            <a:r>
-              <a:rPr lang="en-US" sz="1000" dirty="0" smtClean="0">
-                <a:latin typeface="Arial" pitchFamily="34" charset="0"/>
-                <a:cs typeface="Arial" pitchFamily="34" charset="0"/>
-              </a:rPr>
-              <a:t> May lead to lower quality of flying from intercept aircraft due to lack of GCI support</a:t>
-            </a:r>
-          </a:p>
-          <a:p>
-            <a:pPr>
-              <a:buFontTx/>
-              <a:buChar char="-"/>
-            </a:pPr>
-            <a:endParaRPr lang="en-US" sz="1000" dirty="0" smtClean="0">
-              <a:latin typeface="Arial" pitchFamily="34" charset="0"/>
-              <a:cs typeface="Arial" pitchFamily="34" charset="0"/>
-            </a:endParaRPr>
-          </a:p>
-          <a:p>
-            <a:endParaRPr lang="en-US" sz="1000" dirty="0" smtClean="0">
-              <a:latin typeface="Arial" pitchFamily="34" charset="0"/>
-              <a:cs typeface="Arial" pitchFamily="34" charset="0"/>
-            </a:endParaRPr>
-          </a:p>
-          <a:p>
-            <a:r>
-              <a:rPr lang="en-US" sz="1000" dirty="0" smtClean="0">
-                <a:latin typeface="Arial" pitchFamily="34" charset="0"/>
-                <a:cs typeface="Arial" pitchFamily="34" charset="0"/>
-              </a:rPr>
-              <a:t> </a:t>
-            </a:r>
+              <a:t> Fighter Squadrons are the only squadron with a limited capability to conduct escort missions for A-G flights.</a:t>
+            </a:r>
+          </a:p>
+          <a:p>
+            <a:endParaRPr lang="en-US" sz="1200" dirty="0" smtClean="0"/>
+          </a:p>
+          <a:p>
+            <a:endParaRPr lang="en-US" sz="1200" dirty="0" smtClean="0"/>
+          </a:p>
+          <a:p>
+            <a:endParaRPr lang="en-US" sz="1200" dirty="0" smtClean="0"/>
+          </a:p>
+          <a:p>
+            <a:endParaRPr lang="en-US" sz="1200" dirty="0" smtClean="0"/>
           </a:p>
           <a:p>
             <a:endParaRPr lang="en-US" sz="1200" dirty="0" smtClean="0"/>
@@ -36613,7 +36681,126 @@
       </p:sp>
       <p:sp>
         <p:nvSpPr>
-          <p:cNvPr id="21" name="TekstSylinder 20"/>
+          <p:cNvPr id="25" name="TekstSylinder 24"/>
+          <p:cNvSpPr txBox="1"/>
+          <p:nvPr/>
+        </p:nvSpPr>
+        <p:spPr>
+          <a:xfrm>
+            <a:off x="3059832" y="658365"/>
+            <a:ext cx="3024336" cy="4071966"/>
+          </a:xfrm>
+          <a:prstGeom prst="rect">
+            <a:avLst/>
+          </a:prstGeom>
+          <a:solidFill>
+            <a:schemeClr val="accent1">
+              <a:lumMod val="20000"/>
+              <a:lumOff val="80000"/>
+            </a:schemeClr>
+          </a:solidFill>
+          <a:ln>
+            <a:solidFill>
+              <a:schemeClr val="tx1"/>
+            </a:solidFill>
+          </a:ln>
+        </p:spPr>
+        <p:txBody>
+          <a:bodyPr wrap="square" rtlCol="0">
+            <a:normAutofit/>
+          </a:bodyPr>
+          <a:lstStyle/>
+          <a:p>
+            <a:r>
+              <a:rPr lang="en-US" sz="1200" b="1" dirty="0" smtClean="0">
+                <a:latin typeface="Arial" pitchFamily="34" charset="0"/>
+                <a:cs typeface="Arial" pitchFamily="34" charset="0"/>
+              </a:rPr>
+              <a:t>Air operations: A-G</a:t>
+            </a:r>
+          </a:p>
+          <a:p>
+            <a:r>
+              <a:rPr lang="en-US" sz="1000" dirty="0" smtClean="0">
+                <a:latin typeface="Arial" pitchFamily="34" charset="0"/>
+                <a:cs typeface="Arial" pitchFamily="34" charset="0"/>
+              </a:rPr>
+              <a:t>Syrian Air Force has a very limited if not absent inter-agency coordination between the Air Force and ground forces. Ground forces have limited means to cooperate with the Air Force, and different Districts cannot operate together on high tempo operations. This is due to organization design, command structures, lack of specific training and focus for the ground forces.</a:t>
+            </a:r>
+          </a:p>
+          <a:p>
+            <a:endParaRPr lang="en-US" sz="1000" dirty="0" smtClean="0">
+              <a:latin typeface="Arial" pitchFamily="34" charset="0"/>
+              <a:cs typeface="Arial" pitchFamily="34" charset="0"/>
+            </a:endParaRPr>
+          </a:p>
+          <a:p>
+            <a:r>
+              <a:rPr lang="en-US" sz="1000" dirty="0" smtClean="0">
+                <a:latin typeface="Arial" pitchFamily="34" charset="0"/>
+                <a:cs typeface="Arial" pitchFamily="34" charset="0"/>
+              </a:rPr>
+              <a:t>For major ground offensives assault aviation squadrons will contribute to shaping the </a:t>
+            </a:r>
+            <a:r>
+              <a:rPr lang="en-US" sz="1000" dirty="0" err="1" smtClean="0">
+                <a:latin typeface="Arial" pitchFamily="34" charset="0"/>
+                <a:cs typeface="Arial" pitchFamily="34" charset="0"/>
+              </a:rPr>
+              <a:t>battlefied</a:t>
+            </a:r>
+            <a:r>
+              <a:rPr lang="en-US" sz="1000" dirty="0" smtClean="0">
+                <a:latin typeface="Arial" pitchFamily="34" charset="0"/>
+                <a:cs typeface="Arial" pitchFamily="34" charset="0"/>
+              </a:rPr>
+              <a:t> prior to the start of the Syrian ground attack. Once the Syrian ground attack is moving forward, the assault aviation squadrons will not conduct CAS operations. Assault aviation squadrons will then be used further ahead from the attack in a AR role, or keeping the enemy busy by attacking elsewhere. </a:t>
+            </a:r>
+          </a:p>
+          <a:p>
+            <a:endParaRPr lang="en-US" sz="1000" dirty="0" smtClean="0">
+              <a:latin typeface="Arial" pitchFamily="34" charset="0"/>
+              <a:cs typeface="Arial" pitchFamily="34" charset="0"/>
+            </a:endParaRPr>
+          </a:p>
+          <a:p>
+            <a:r>
+              <a:rPr lang="en-US" sz="1000" dirty="0" smtClean="0">
+                <a:latin typeface="Arial" pitchFamily="34" charset="0"/>
+                <a:cs typeface="Arial" pitchFamily="34" charset="0"/>
+              </a:rPr>
+              <a:t>When Syrian ground forces are in defensive positions, and are fairly static, they can use CAS to attack against incoming enemies.</a:t>
+            </a:r>
+          </a:p>
+          <a:p>
+            <a:endParaRPr lang="en-US" sz="1200" dirty="0" smtClean="0"/>
+          </a:p>
+          <a:p>
+            <a:endParaRPr lang="en-US" sz="1200" dirty="0" smtClean="0"/>
+          </a:p>
+          <a:p>
+            <a:endParaRPr lang="en-US" sz="1200" dirty="0" smtClean="0"/>
+          </a:p>
+          <a:p>
+            <a:endParaRPr lang="en-US" sz="1200" dirty="0" smtClean="0"/>
+          </a:p>
+          <a:p>
+            <a:endParaRPr lang="en-US" sz="1200" dirty="0" smtClean="0"/>
+          </a:p>
+          <a:p>
+            <a:endParaRPr lang="en-US" sz="1200" dirty="0" smtClean="0"/>
+          </a:p>
+          <a:p>
+            <a:endParaRPr lang="nb-NO" sz="1200" dirty="0" smtClean="0">
+              <a:latin typeface="Arial" pitchFamily="34" charset="0"/>
+              <a:cs typeface="Arial" pitchFamily="34" charset="0"/>
+            </a:endParaRPr>
+          </a:p>
+        </p:txBody>
+      </p:sp>
+      <p:sp>
+        <p:nvSpPr>
+          <p:cNvPr id="20" name="TekstSylinder 19"/>
           <p:cNvSpPr txBox="1"/>
           <p:nvPr/>
         </p:nvSpPr>
@@ -36706,7 +36893,7 @@
           <a:p>
             <a:r>
               <a:rPr lang="en-US" dirty="0" smtClean="0"/>
-              <a:t>Other critical targets</a:t>
+              <a:t>Command and Control</a:t>
             </a:r>
             <a:endParaRPr lang="en-US" dirty="0"/>
           </a:p>
@@ -37364,25 +37551,56 @@
         </p:spPr>
         <p:txBody>
           <a:bodyPr wrap="square" rtlCol="0">
-            <a:normAutofit/>
+            <a:normAutofit lnSpcReduction="10000"/>
           </a:bodyPr>
           <a:lstStyle/>
-          <a:p>
-            <a:r>
-              <a:rPr lang="en-US" sz="1000" b="1" u="sng" dirty="0" smtClean="0">
-                <a:latin typeface="Arial" pitchFamily="34" charset="0"/>
-                <a:cs typeface="Arial" pitchFamily="34" charset="0"/>
-              </a:rPr>
-              <a:t>Airfields:</a:t>
-            </a:r>
-          </a:p>
           <a:p>
             <a:r>
               <a:rPr lang="en-US" sz="1000" b="1" dirty="0" smtClean="0">
                 <a:latin typeface="Arial" pitchFamily="34" charset="0"/>
                 <a:cs typeface="Arial" pitchFamily="34" charset="0"/>
               </a:rPr>
-              <a:t>Runways:</a:t>
+              <a:t>Notian </a:t>
+            </a:r>
+            <a:r>
+              <a:rPr lang="en-US" sz="1000" b="1" dirty="0" smtClean="0">
+                <a:latin typeface="Arial" pitchFamily="34" charset="0"/>
+                <a:cs typeface="Arial" pitchFamily="34" charset="0"/>
+              </a:rPr>
+              <a:t>Air Force Headquarter</a:t>
+            </a:r>
+          </a:p>
+          <a:p>
+            <a:r>
+              <a:rPr lang="en-US" sz="1000" dirty="0" smtClean="0">
+                <a:latin typeface="Arial" pitchFamily="34" charset="0"/>
+                <a:cs typeface="Arial" pitchFamily="34" charset="0"/>
+              </a:rPr>
+              <a:t>- Work with long term plans, training, budgeting  and will have no effect on the short term.</a:t>
+            </a:r>
+          </a:p>
+          <a:p>
+            <a:r>
+              <a:rPr lang="en-US" sz="1000" dirty="0" smtClean="0">
+                <a:latin typeface="Arial" pitchFamily="34" charset="0"/>
+                <a:cs typeface="Arial" pitchFamily="34" charset="0"/>
+              </a:rPr>
+              <a:t>- If destroyed will reduce ability to train new pilots, introduce new aircraft, weapons and systems.</a:t>
+            </a:r>
+          </a:p>
+          <a:p>
+            <a:endParaRPr lang="en-US" sz="1000" dirty="0" smtClean="0">
+              <a:latin typeface="Arial" pitchFamily="34" charset="0"/>
+              <a:cs typeface="Arial" pitchFamily="34" charset="0"/>
+            </a:endParaRPr>
+          </a:p>
+          <a:p>
+            <a:r>
+              <a:rPr lang="en-US" sz="1000" b="1" dirty="0" smtClean="0">
+                <a:latin typeface="Arial" pitchFamily="34" charset="0"/>
+                <a:cs typeface="Arial" pitchFamily="34" charset="0"/>
+              </a:rPr>
+              <a:t>Air Division Headquarter</a:t>
             </a:r>
           </a:p>
           <a:p>
@@ -37395,7 +37613,21 @@
                 <a:latin typeface="Arial" pitchFamily="34" charset="0"/>
                 <a:cs typeface="Arial" pitchFamily="34" charset="0"/>
               </a:rPr>
-              <a:t>Airfield out of operation for 24-48 hours</a:t>
+              <a:t>Plans and execute major </a:t>
+            </a:r>
+            <a:r>
+              <a:rPr lang="en-US" sz="1000" dirty="0" smtClean="0">
+                <a:latin typeface="Arial" pitchFamily="34" charset="0"/>
+                <a:cs typeface="Arial" pitchFamily="34" charset="0"/>
+              </a:rPr>
+              <a:t>Notian </a:t>
+            </a:r>
+            <a:r>
+              <a:rPr lang="en-US" sz="1000" dirty="0" smtClean="0">
+                <a:latin typeface="Arial" pitchFamily="34" charset="0"/>
+                <a:cs typeface="Arial" pitchFamily="34" charset="0"/>
+              </a:rPr>
+              <a:t>air operations.</a:t>
             </a:r>
           </a:p>
           <a:p>
@@ -37408,7 +37640,109 @@
                 <a:latin typeface="Arial" pitchFamily="34" charset="0"/>
                 <a:cs typeface="Arial" pitchFamily="34" charset="0"/>
               </a:rPr>
-              <a:t>Depending on the amount of damage inflicted</a:t>
+              <a:t> If destroyed, the squadrons belonging to that division will not be able to participate in major air operations until a new division headquarter is </a:t>
+            </a:r>
+            <a:r>
+              <a:rPr lang="en-US" sz="1000" dirty="0" smtClean="0">
+                <a:latin typeface="Arial" pitchFamily="34" charset="0"/>
+                <a:cs typeface="Arial" pitchFamily="34" charset="0"/>
+              </a:rPr>
+              <a:t>operational (COMAO).</a:t>
+            </a:r>
+            <a:endParaRPr lang="en-US" sz="1000" dirty="0" smtClean="0">
+              <a:latin typeface="Arial" pitchFamily="34" charset="0"/>
+              <a:cs typeface="Arial" pitchFamily="34" charset="0"/>
+            </a:endParaRPr>
+          </a:p>
+          <a:p>
+            <a:endParaRPr lang="en-US" sz="1000" dirty="0" smtClean="0">
+              <a:latin typeface="Arial" pitchFamily="34" charset="0"/>
+              <a:cs typeface="Arial" pitchFamily="34" charset="0"/>
+            </a:endParaRPr>
+          </a:p>
+          <a:p>
+            <a:endParaRPr lang="en-US" sz="1000" dirty="0" smtClean="0">
+              <a:latin typeface="Arial" pitchFamily="34" charset="0"/>
+              <a:cs typeface="Arial" pitchFamily="34" charset="0"/>
+            </a:endParaRPr>
+          </a:p>
+          <a:p>
+            <a:r>
+              <a:rPr lang="en-US" sz="1000" b="1" dirty="0" smtClean="0">
+                <a:latin typeface="Arial" pitchFamily="34" charset="0"/>
+                <a:cs typeface="Arial" pitchFamily="34" charset="0"/>
+              </a:rPr>
+              <a:t>Ground Controlled Intercept (GCI)</a:t>
+            </a:r>
+          </a:p>
+          <a:p>
+            <a:pPr>
+              <a:buFontTx/>
+              <a:buChar char="-"/>
+            </a:pPr>
+            <a:r>
+              <a:rPr lang="en-US" sz="1000" dirty="0" smtClean="0">
+                <a:latin typeface="Arial" pitchFamily="34" charset="0"/>
+                <a:cs typeface="Arial" pitchFamily="34" charset="0"/>
+              </a:rPr>
+              <a:t>Normally located in a sector command center (SCC) as part of the Integrated Air Defense System (IADS).</a:t>
+            </a:r>
+          </a:p>
+          <a:p>
+            <a:pPr>
+              <a:buFontTx/>
+              <a:buChar char="-"/>
+            </a:pPr>
+            <a:r>
+              <a:rPr lang="en-US" sz="1000" dirty="0" smtClean="0">
+                <a:latin typeface="Arial" pitchFamily="34" charset="0"/>
+                <a:cs typeface="Arial" pitchFamily="34" charset="0"/>
+              </a:rPr>
+              <a:t>GCI Supports the Syrian Air Defense with control of fighters and interceptors conducting Defensive Counter Air (DCA) operations. </a:t>
+            </a:r>
+          </a:p>
+          <a:p>
+            <a:r>
+              <a:rPr lang="en-US" sz="1000" dirty="0" smtClean="0">
+                <a:latin typeface="Arial" pitchFamily="34" charset="0"/>
+                <a:cs typeface="Arial" pitchFamily="34" charset="0"/>
+              </a:rPr>
+              <a:t>If destroyed:</a:t>
+            </a:r>
+          </a:p>
+          <a:p>
+            <a:r>
+              <a:rPr lang="en-US" sz="1000" dirty="0" smtClean="0">
+                <a:latin typeface="Arial" pitchFamily="34" charset="0"/>
+                <a:cs typeface="Arial" pitchFamily="34" charset="0"/>
+              </a:rPr>
+              <a:t>- May prevent scrambles of intercept aircraft</a:t>
+            </a:r>
+          </a:p>
+          <a:p>
+            <a:pPr>
+              <a:buFontTx/>
+              <a:buChar char="-"/>
+            </a:pPr>
+            <a:r>
+              <a:rPr lang="en-US" sz="1000" dirty="0" smtClean="0">
+                <a:latin typeface="Arial" pitchFamily="34" charset="0"/>
+                <a:cs typeface="Arial" pitchFamily="34" charset="0"/>
+              </a:rPr>
+              <a:t> May lead to intercept aircraft flying to wrong areas</a:t>
+            </a:r>
+          </a:p>
+          <a:p>
+            <a:pPr>
+              <a:buFontTx/>
+              <a:buChar char="-"/>
+            </a:pPr>
+            <a:r>
+              <a:rPr lang="en-US" sz="1000" dirty="0" smtClean="0">
+                <a:latin typeface="Arial" pitchFamily="34" charset="0"/>
+                <a:cs typeface="Arial" pitchFamily="34" charset="0"/>
+              </a:rPr>
+              <a:t> May lead to lower quality of flying from intercept aircraft due to lack of GCI support</a:t>
             </a:r>
           </a:p>
           <a:p>
@@ -37422,152 +37756,18 @@
             </a:endParaRPr>
           </a:p>
           <a:p>
-            <a:r>
-              <a:rPr lang="en-US" sz="1000" b="1" dirty="0" smtClean="0">
-                <a:latin typeface="Arial" pitchFamily="34" charset="0"/>
-                <a:cs typeface="Arial" pitchFamily="34" charset="0"/>
-              </a:rPr>
-              <a:t>Ammunition storage:</a:t>
-            </a:r>
-          </a:p>
-          <a:p>
-            <a:pPr>
-              <a:buFontTx/>
-              <a:buChar char="-"/>
-            </a:pPr>
+            <a:endParaRPr lang="en-US" sz="1000" dirty="0" smtClean="0">
+              <a:latin typeface="Arial" pitchFamily="34" charset="0"/>
+              <a:cs typeface="Arial" pitchFamily="34" charset="0"/>
+            </a:endParaRPr>
+          </a:p>
+          <a:p>
             <a:r>
               <a:rPr lang="en-US" sz="1000" dirty="0" smtClean="0">
                 <a:latin typeface="Arial" pitchFamily="34" charset="0"/>
                 <a:cs typeface="Arial" pitchFamily="34" charset="0"/>
               </a:rPr>
-              <a:t>Certain types of ammunition unavailable</a:t>
-            </a:r>
-          </a:p>
-          <a:p>
-            <a:pPr>
-              <a:buFontTx/>
-              <a:buChar char="-"/>
-            </a:pPr>
-            <a:r>
-              <a:rPr lang="en-US" sz="1000" dirty="0" smtClean="0">
-                <a:latin typeface="Arial" pitchFamily="34" charset="0"/>
-                <a:cs typeface="Arial" pitchFamily="34" charset="0"/>
-              </a:rPr>
-              <a:t>Sortie rates reduced</a:t>
-            </a:r>
-          </a:p>
-          <a:p>
-            <a:pPr>
-              <a:buFontTx/>
-              <a:buChar char="-"/>
-            </a:pPr>
-            <a:r>
-              <a:rPr lang="en-US" sz="1000" dirty="0" smtClean="0">
-                <a:latin typeface="Arial" pitchFamily="34" charset="0"/>
-                <a:cs typeface="Arial" pitchFamily="34" charset="0"/>
-              </a:rPr>
-              <a:t>Depending on the amount of damage inflicted</a:t>
-            </a:r>
-          </a:p>
-          <a:p>
-            <a:endParaRPr lang="en-US" sz="1000" dirty="0" smtClean="0">
-              <a:latin typeface="Arial" pitchFamily="34" charset="0"/>
-              <a:cs typeface="Arial" pitchFamily="34" charset="0"/>
-            </a:endParaRPr>
-          </a:p>
-          <a:p>
-            <a:r>
-              <a:rPr lang="en-US" sz="1000" b="1" dirty="0" smtClean="0">
-                <a:latin typeface="Arial" pitchFamily="34" charset="0"/>
-                <a:cs typeface="Arial" pitchFamily="34" charset="0"/>
-              </a:rPr>
-              <a:t>Fuel:</a:t>
-            </a:r>
-          </a:p>
-          <a:p>
-            <a:pPr>
-              <a:buFontTx/>
-              <a:buChar char="-"/>
-            </a:pPr>
-            <a:r>
-              <a:rPr lang="en-US" sz="1000" dirty="0" smtClean="0">
-                <a:latin typeface="Arial" pitchFamily="34" charset="0"/>
-                <a:cs typeface="Arial" pitchFamily="34" charset="0"/>
-              </a:rPr>
-              <a:t>Sortie rates reduced until able to resupply</a:t>
-            </a:r>
-          </a:p>
-          <a:p>
-            <a:pPr>
-              <a:buFontTx/>
-              <a:buChar char="-"/>
-            </a:pPr>
-            <a:r>
-              <a:rPr lang="en-US" sz="1000" dirty="0" smtClean="0">
-                <a:latin typeface="Arial" pitchFamily="34" charset="0"/>
-                <a:cs typeface="Arial" pitchFamily="34" charset="0"/>
-              </a:rPr>
-              <a:t>Depending on the amount of damage inflicted</a:t>
-            </a:r>
-          </a:p>
-          <a:p>
-            <a:endParaRPr lang="en-US" sz="1000" dirty="0" smtClean="0">
-              <a:latin typeface="Arial" pitchFamily="34" charset="0"/>
-              <a:cs typeface="Arial" pitchFamily="34" charset="0"/>
-            </a:endParaRPr>
-          </a:p>
-          <a:p>
-            <a:r>
-              <a:rPr lang="en-US" sz="1000" b="1" dirty="0" smtClean="0">
-                <a:latin typeface="Arial" pitchFamily="34" charset="0"/>
-                <a:cs typeface="Arial" pitchFamily="34" charset="0"/>
-              </a:rPr>
-              <a:t>Maintenance:</a:t>
-            </a:r>
-          </a:p>
-          <a:p>
-            <a:r>
-              <a:rPr lang="en-US" sz="1000" dirty="0" smtClean="0">
-                <a:latin typeface="Arial" pitchFamily="34" charset="0"/>
-                <a:cs typeface="Arial" pitchFamily="34" charset="0"/>
-              </a:rPr>
-              <a:t>- Squadron readiness reduced to low readiness due to reduced ability to conduct maintenance</a:t>
-            </a:r>
-          </a:p>
-          <a:p>
-            <a:endParaRPr lang="en-US" sz="1000" dirty="0" smtClean="0">
-              <a:latin typeface="Arial" pitchFamily="34" charset="0"/>
-              <a:cs typeface="Arial" pitchFamily="34" charset="0"/>
-            </a:endParaRPr>
-          </a:p>
-          <a:p>
-            <a:endParaRPr lang="en-US" sz="1000" dirty="0" smtClean="0">
-              <a:latin typeface="Arial" pitchFamily="34" charset="0"/>
-              <a:cs typeface="Arial" pitchFamily="34" charset="0"/>
-            </a:endParaRPr>
-          </a:p>
-          <a:p>
-            <a:endParaRPr lang="en-US" sz="1000" dirty="0" smtClean="0">
-              <a:latin typeface="Arial" pitchFamily="34" charset="0"/>
-              <a:cs typeface="Arial" pitchFamily="34" charset="0"/>
-            </a:endParaRPr>
-          </a:p>
-          <a:p>
-            <a:r>
-              <a:rPr lang="en-US" sz="1000" b="1" dirty="0" smtClean="0">
-                <a:latin typeface="Arial" pitchFamily="34" charset="0"/>
-                <a:cs typeface="Arial" pitchFamily="34" charset="0"/>
-              </a:rPr>
-              <a:t>Aircrafts</a:t>
-            </a:r>
-          </a:p>
-          <a:p>
-            <a:r>
-              <a:rPr lang="en-US" sz="1000" dirty="0" smtClean="0">
-                <a:latin typeface="Arial" pitchFamily="34" charset="0"/>
-                <a:cs typeface="Arial" pitchFamily="34" charset="0"/>
-              </a:rPr>
-              <a:t>- Destruction of aircraft will reduced the capability of the squadron as they have fewer aircraft available</a:t>
+              <a:t> </a:t>
             </a:r>
           </a:p>
           <a:p>
@@ -37620,99 +37820,11 @@
           </a:p>
         </p:txBody>
       </p:sp>
-      <p:pic>
-        <p:nvPicPr>
-          <p:cNvPr id="20" name="Picture 4"/>
-          <p:cNvPicPr>
-            <a:picLocks noChangeAspect="1" noChangeArrowheads="1"/>
-          </p:cNvPicPr>
-          <p:nvPr/>
-        </p:nvPicPr>
-        <p:blipFill>
-          <a:blip r:embed="rId3" cstate="print"/>
-          <a:srcRect/>
-          <a:stretch>
-            <a:fillRect/>
-          </a:stretch>
-        </p:blipFill>
-        <p:spPr bwMode="auto">
-          <a:xfrm>
-            <a:off x="5940152" y="1923678"/>
-            <a:ext cx="2494198" cy="1467887"/>
-          </a:xfrm>
-          <a:prstGeom prst="rect">
-            <a:avLst/>
-          </a:prstGeom>
-          <a:noFill/>
-          <a:ln w="15875">
-            <a:solidFill>
-              <a:schemeClr val="tx1"/>
-            </a:solidFill>
-            <a:miter lim="800000"/>
-            <a:headEnd/>
-            <a:tailEnd/>
-          </a:ln>
-          <a:effectLst>
-            <a:outerShdw blurRad="50800" dist="38100" dir="2700000" algn="tl" rotWithShape="0">
-              <a:prstClr val="black">
-                <a:alpha val="40000"/>
-              </a:prstClr>
-            </a:outerShdw>
-          </a:effectLst>
-        </p:spPr>
-      </p:pic>
-      <p:sp>
-        <p:nvSpPr>
-          <p:cNvPr id="21" name="TekstSylinder 20"/>
-          <p:cNvSpPr txBox="1"/>
-          <p:nvPr/>
-        </p:nvSpPr>
-        <p:spPr>
-          <a:xfrm rot="20697024">
-            <a:off x="2706735" y="3136656"/>
-            <a:ext cx="4420315" cy="523220"/>
-          </a:xfrm>
-          <a:prstGeom prst="rect">
-            <a:avLst/>
-          </a:prstGeom>
-          <a:solidFill>
-            <a:schemeClr val="bg1"/>
-          </a:solidFill>
-          <a:ln>
-            <a:solidFill>
-              <a:srgbClr val="FF0000"/>
-            </a:solidFill>
-          </a:ln>
-        </p:spPr>
-        <p:txBody>
-          <a:bodyPr wrap="square" rtlCol="0">
-            <a:spAutoFit/>
-          </a:bodyPr>
-          <a:lstStyle/>
-          <a:p>
-            <a:pPr algn="ctr"/>
-            <a:r>
-              <a:rPr lang="nb-NO" sz="2800" b="1" dirty="0" smtClean="0">
-                <a:solidFill>
-                  <a:srgbClr val="FF0000"/>
-                </a:solidFill>
-              </a:rPr>
-              <a:t>WORK IN PROGRESS</a:t>
-            </a:r>
-            <a:endParaRPr lang="nb-NO" sz="2800" b="1" dirty="0">
-              <a:solidFill>
-                <a:srgbClr val="FF0000"/>
-              </a:solidFill>
-            </a:endParaRPr>
-          </a:p>
-        </p:txBody>
-      </p:sp>
     </p:spTree>
   </p:cSld>
   <p:clrMapOvr>
     <a:masterClrMapping/>
   </p:clrMapOvr>
-  <p:transition/>
   <p:timing>
     <p:tnLst>
       <p:par>
@@ -37757,7 +37869,7 @@
           <a:p>
             <a:r>
               <a:rPr lang="en-US" dirty="0" smtClean="0"/>
-              <a:t>Mission type capability</a:t>
+              <a:t>Other critical targets</a:t>
             </a:r>
             <a:endParaRPr lang="en-US" dirty="0"/>
           </a:p>
@@ -38420,115 +38532,46 @@
           <a:lstStyle/>
           <a:p>
             <a:r>
+              <a:rPr lang="en-US" sz="1000" b="1" u="sng" dirty="0" smtClean="0">
+                <a:latin typeface="Arial" pitchFamily="34" charset="0"/>
+                <a:cs typeface="Arial" pitchFamily="34" charset="0"/>
+              </a:rPr>
+              <a:t>Airfields:</a:t>
+            </a:r>
+          </a:p>
+          <a:p>
+            <a:r>
+              <a:rPr lang="en-US" sz="1000" b="1" dirty="0" smtClean="0">
+                <a:latin typeface="Arial" pitchFamily="34" charset="0"/>
+                <a:cs typeface="Arial" pitchFamily="34" charset="0"/>
+              </a:rPr>
+              <a:t>Runways:</a:t>
+            </a:r>
+          </a:p>
+          <a:p>
+            <a:pPr>
+              <a:buFontTx/>
+              <a:buChar char="-"/>
+            </a:pPr>
+            <a:r>
               <a:rPr lang="en-US" sz="1000" dirty="0" smtClean="0">
                 <a:latin typeface="Arial" pitchFamily="34" charset="0"/>
                 <a:cs typeface="Arial" pitchFamily="34" charset="0"/>
               </a:rPr>
-              <a:t>Fighter squadrons conduct the following mission sets:</a:t>
-            </a:r>
-          </a:p>
-          <a:p>
+              <a:t>Airfield out of operation for 24-48 hours</a:t>
+            </a:r>
+          </a:p>
+          <a:p>
+            <a:pPr>
+              <a:buFontTx/>
+              <a:buChar char="-"/>
+            </a:pPr>
             <a:r>
               <a:rPr lang="en-US" sz="1000" dirty="0" smtClean="0">
                 <a:latin typeface="Arial" pitchFamily="34" charset="0"/>
                 <a:cs typeface="Arial" pitchFamily="34" charset="0"/>
               </a:rPr>
-              <a:t>- Sweep</a:t>
-            </a:r>
-          </a:p>
-          <a:p>
-            <a:pPr>
-              <a:buFontTx/>
-              <a:buChar char="-"/>
-            </a:pPr>
-            <a:r>
-              <a:rPr lang="en-US" sz="1000" dirty="0" smtClean="0">
-                <a:latin typeface="Arial" pitchFamily="34" charset="0"/>
-                <a:cs typeface="Arial" pitchFamily="34" charset="0"/>
-              </a:rPr>
-              <a:t>CAP</a:t>
-            </a:r>
-          </a:p>
-          <a:p>
-            <a:pPr>
-              <a:buFontTx/>
-              <a:buChar char="-"/>
-            </a:pPr>
-            <a:r>
-              <a:rPr lang="en-US" sz="1000" dirty="0" smtClean="0">
-                <a:latin typeface="Arial" pitchFamily="34" charset="0"/>
-                <a:cs typeface="Arial" pitchFamily="34" charset="0"/>
-              </a:rPr>
-              <a:t>Limited form of escort</a:t>
-            </a:r>
-          </a:p>
-          <a:p>
-            <a:endParaRPr lang="en-US" sz="1000" dirty="0" smtClean="0">
-              <a:latin typeface="Arial" pitchFamily="34" charset="0"/>
-              <a:cs typeface="Arial" pitchFamily="34" charset="0"/>
-            </a:endParaRPr>
-          </a:p>
-          <a:p>
-            <a:r>
-              <a:rPr lang="en-US" sz="1000" dirty="0" smtClean="0">
-                <a:latin typeface="Arial" pitchFamily="34" charset="0"/>
-                <a:cs typeface="Arial" pitchFamily="34" charset="0"/>
-              </a:rPr>
-              <a:t>Interceptor squadrons are based at airfields and tied to Syrian IADS and supports as Quick Reaction Alert flights to protect Syrian airfields from attack.</a:t>
-            </a:r>
-          </a:p>
-          <a:p>
-            <a:endParaRPr lang="en-US" sz="1000" dirty="0" smtClean="0">
-              <a:latin typeface="Arial" pitchFamily="34" charset="0"/>
-              <a:cs typeface="Arial" pitchFamily="34" charset="0"/>
-            </a:endParaRPr>
-          </a:p>
-          <a:p>
-            <a:r>
-              <a:rPr lang="en-US" sz="1000" dirty="0" smtClean="0">
-                <a:latin typeface="Arial" pitchFamily="34" charset="0"/>
-                <a:cs typeface="Arial" pitchFamily="34" charset="0"/>
-              </a:rPr>
-              <a:t>Assault Aviation squadrons conduct the following mission sets:</a:t>
-            </a:r>
-          </a:p>
-          <a:p>
-            <a:pPr>
-              <a:buFontTx/>
-              <a:buChar char="-"/>
-            </a:pPr>
-            <a:r>
-              <a:rPr lang="en-US" sz="1000" dirty="0" smtClean="0">
-                <a:latin typeface="Arial" pitchFamily="34" charset="0"/>
-                <a:cs typeface="Arial" pitchFamily="34" charset="0"/>
-              </a:rPr>
-              <a:t>CAS (with ground forces in static positions)</a:t>
-            </a:r>
-          </a:p>
-          <a:p>
-            <a:pPr>
-              <a:buFontTx/>
-              <a:buChar char="-"/>
-            </a:pPr>
-            <a:r>
-              <a:rPr lang="en-US" sz="1000" dirty="0" smtClean="0">
-                <a:latin typeface="Arial" pitchFamily="34" charset="0"/>
-                <a:cs typeface="Arial" pitchFamily="34" charset="0"/>
-              </a:rPr>
-              <a:t>AR</a:t>
-            </a:r>
-          </a:p>
-          <a:p>
-            <a:pPr>
-              <a:buFontTx/>
-              <a:buChar char="-"/>
-            </a:pPr>
-            <a:r>
-              <a:rPr lang="en-US" sz="1000" dirty="0" smtClean="0">
-                <a:latin typeface="Arial" pitchFamily="34" charset="0"/>
-                <a:cs typeface="Arial" pitchFamily="34" charset="0"/>
-              </a:rPr>
-              <a:t>AI</a:t>
+              <a:t>Depending on the amount of damage inflicted</a:t>
             </a:r>
           </a:p>
           <a:p>
@@ -38542,6 +38585,1101 @@
             </a:endParaRPr>
           </a:p>
           <a:p>
+            <a:r>
+              <a:rPr lang="en-US" sz="1000" b="1" dirty="0" smtClean="0">
+                <a:latin typeface="Arial" pitchFamily="34" charset="0"/>
+                <a:cs typeface="Arial" pitchFamily="34" charset="0"/>
+              </a:rPr>
+              <a:t>Ammunition storage:</a:t>
+            </a:r>
+          </a:p>
+          <a:p>
+            <a:pPr>
+              <a:buFontTx/>
+              <a:buChar char="-"/>
+            </a:pPr>
+            <a:r>
+              <a:rPr lang="en-US" sz="1000" dirty="0" smtClean="0">
+                <a:latin typeface="Arial" pitchFamily="34" charset="0"/>
+                <a:cs typeface="Arial" pitchFamily="34" charset="0"/>
+              </a:rPr>
+              <a:t>Certain types of ammunition unavailable</a:t>
+            </a:r>
+          </a:p>
+          <a:p>
+            <a:pPr>
+              <a:buFontTx/>
+              <a:buChar char="-"/>
+            </a:pPr>
+            <a:r>
+              <a:rPr lang="en-US" sz="1000" dirty="0" smtClean="0">
+                <a:latin typeface="Arial" pitchFamily="34" charset="0"/>
+                <a:cs typeface="Arial" pitchFamily="34" charset="0"/>
+              </a:rPr>
+              <a:t>Sortie rates reduced</a:t>
+            </a:r>
+          </a:p>
+          <a:p>
+            <a:pPr>
+              <a:buFontTx/>
+              <a:buChar char="-"/>
+            </a:pPr>
+            <a:r>
+              <a:rPr lang="en-US" sz="1000" dirty="0" smtClean="0">
+                <a:latin typeface="Arial" pitchFamily="34" charset="0"/>
+                <a:cs typeface="Arial" pitchFamily="34" charset="0"/>
+              </a:rPr>
+              <a:t>Depending on the amount of damage inflicted</a:t>
+            </a:r>
+          </a:p>
+          <a:p>
+            <a:endParaRPr lang="en-US" sz="1000" dirty="0" smtClean="0">
+              <a:latin typeface="Arial" pitchFamily="34" charset="0"/>
+              <a:cs typeface="Arial" pitchFamily="34" charset="0"/>
+            </a:endParaRPr>
+          </a:p>
+          <a:p>
+            <a:r>
+              <a:rPr lang="en-US" sz="1000" b="1" dirty="0" smtClean="0">
+                <a:latin typeface="Arial" pitchFamily="34" charset="0"/>
+                <a:cs typeface="Arial" pitchFamily="34" charset="0"/>
+              </a:rPr>
+              <a:t>Fuel:</a:t>
+            </a:r>
+          </a:p>
+          <a:p>
+            <a:pPr>
+              <a:buFontTx/>
+              <a:buChar char="-"/>
+            </a:pPr>
+            <a:r>
+              <a:rPr lang="en-US" sz="1000" dirty="0" smtClean="0">
+                <a:latin typeface="Arial" pitchFamily="34" charset="0"/>
+                <a:cs typeface="Arial" pitchFamily="34" charset="0"/>
+              </a:rPr>
+              <a:t>Sortie rates reduced until able to resupply</a:t>
+            </a:r>
+          </a:p>
+          <a:p>
+            <a:pPr>
+              <a:buFontTx/>
+              <a:buChar char="-"/>
+            </a:pPr>
+            <a:r>
+              <a:rPr lang="en-US" sz="1000" dirty="0" smtClean="0">
+                <a:latin typeface="Arial" pitchFamily="34" charset="0"/>
+                <a:cs typeface="Arial" pitchFamily="34" charset="0"/>
+              </a:rPr>
+              <a:t>Depending on the amount of damage inflicted</a:t>
+            </a:r>
+          </a:p>
+          <a:p>
+            <a:endParaRPr lang="en-US" sz="1000" dirty="0" smtClean="0">
+              <a:latin typeface="Arial" pitchFamily="34" charset="0"/>
+              <a:cs typeface="Arial" pitchFamily="34" charset="0"/>
+            </a:endParaRPr>
+          </a:p>
+          <a:p>
+            <a:endParaRPr lang="en-US" sz="1000" dirty="0" smtClean="0">
+              <a:latin typeface="Arial" pitchFamily="34" charset="0"/>
+              <a:cs typeface="Arial" pitchFamily="34" charset="0"/>
+            </a:endParaRPr>
+          </a:p>
+          <a:p>
+            <a:endParaRPr lang="en-US" sz="1000" dirty="0" smtClean="0">
+              <a:latin typeface="Arial" pitchFamily="34" charset="0"/>
+              <a:cs typeface="Arial" pitchFamily="34" charset="0"/>
+            </a:endParaRPr>
+          </a:p>
+          <a:p>
+            <a:endParaRPr lang="en-US" sz="1000" dirty="0" smtClean="0">
+              <a:latin typeface="Arial" pitchFamily="34" charset="0"/>
+              <a:cs typeface="Arial" pitchFamily="34" charset="0"/>
+            </a:endParaRPr>
+          </a:p>
+          <a:p>
+            <a:r>
+              <a:rPr lang="en-US" sz="1000" b="1" dirty="0" smtClean="0">
+                <a:latin typeface="Arial" pitchFamily="34" charset="0"/>
+                <a:cs typeface="Arial" pitchFamily="34" charset="0"/>
+              </a:rPr>
+              <a:t>Aircrafts:</a:t>
+            </a:r>
+            <a:endParaRPr lang="en-US" sz="1000" b="1" dirty="0" smtClean="0">
+              <a:latin typeface="Arial" pitchFamily="34" charset="0"/>
+              <a:cs typeface="Arial" pitchFamily="34" charset="0"/>
+            </a:endParaRPr>
+          </a:p>
+          <a:p>
+            <a:r>
+              <a:rPr lang="en-US" sz="1000" dirty="0" smtClean="0">
+                <a:latin typeface="Arial" pitchFamily="34" charset="0"/>
+                <a:cs typeface="Arial" pitchFamily="34" charset="0"/>
+              </a:rPr>
+              <a:t>- Destruction of aircraft will reduced the capability of the squadron as they have fewer aircraft available</a:t>
+            </a:r>
+          </a:p>
+          <a:p>
+            <a:endParaRPr lang="en-US" sz="1200" dirty="0" smtClean="0"/>
+          </a:p>
+          <a:p>
+            <a:endParaRPr lang="en-US" sz="1200" dirty="0" smtClean="0"/>
+          </a:p>
+          <a:p>
+            <a:endParaRPr lang="nb-NO" sz="1200" dirty="0" smtClean="0">
+              <a:latin typeface="Arial" pitchFamily="34" charset="0"/>
+              <a:cs typeface="Arial" pitchFamily="34" charset="0"/>
+            </a:endParaRPr>
+          </a:p>
+        </p:txBody>
+      </p:sp>
+      <p:sp>
+        <p:nvSpPr>
+          <p:cNvPr id="22" name="Rektangel 21"/>
+          <p:cNvSpPr/>
+          <p:nvPr/>
+        </p:nvSpPr>
+        <p:spPr>
+          <a:xfrm>
+            <a:off x="8446373" y="4643452"/>
+            <a:ext cx="697627" cy="369332"/>
+          </a:xfrm>
+          <a:prstGeom prst="rect">
+            <a:avLst/>
+          </a:prstGeom>
+        </p:spPr>
+        <p:txBody>
+          <a:bodyPr wrap="none">
+            <a:spAutoFit/>
+          </a:bodyPr>
+          <a:lstStyle/>
+          <a:p>
+            <a:r>
+              <a:rPr lang="nb-NO" dirty="0" smtClean="0">
+                <a:latin typeface="Arial" pitchFamily="34" charset="0"/>
+                <a:cs typeface="Arial" pitchFamily="34" charset="0"/>
+                <a:hlinkClick r:id="rId2" action="ppaction://hlinksldjump"/>
+              </a:rPr>
+              <a:t>Back</a:t>
+            </a:r>
+            <a:endParaRPr lang="nb-NO" dirty="0" smtClean="0">
+              <a:latin typeface="Arial" pitchFamily="34" charset="0"/>
+              <a:cs typeface="Arial" pitchFamily="34" charset="0"/>
+            </a:endParaRPr>
+          </a:p>
+        </p:txBody>
+      </p:sp>
+      <p:pic>
+        <p:nvPicPr>
+          <p:cNvPr id="20" name="Picture 4"/>
+          <p:cNvPicPr>
+            <a:picLocks noChangeAspect="1" noChangeArrowheads="1"/>
+          </p:cNvPicPr>
+          <p:nvPr/>
+        </p:nvPicPr>
+        <p:blipFill>
+          <a:blip r:embed="rId3" cstate="print"/>
+          <a:srcRect/>
+          <a:stretch>
+            <a:fillRect/>
+          </a:stretch>
+        </p:blipFill>
+        <p:spPr bwMode="auto">
+          <a:xfrm>
+            <a:off x="5940152" y="1923678"/>
+            <a:ext cx="2494198" cy="1467887"/>
+          </a:xfrm>
+          <a:prstGeom prst="rect">
+            <a:avLst/>
+          </a:prstGeom>
+          <a:noFill/>
+          <a:ln w="15875">
+            <a:solidFill>
+              <a:schemeClr val="tx1"/>
+            </a:solidFill>
+            <a:miter lim="800000"/>
+            <a:headEnd/>
+            <a:tailEnd/>
+          </a:ln>
+          <a:effectLst>
+            <a:outerShdw blurRad="50800" dist="38100" dir="2700000" algn="tl" rotWithShape="0">
+              <a:prstClr val="black">
+                <a:alpha val="40000"/>
+              </a:prstClr>
+            </a:outerShdw>
+          </a:effectLst>
+        </p:spPr>
+      </p:pic>
+    </p:spTree>
+  </p:cSld>
+  <p:clrMapOvr>
+    <a:masterClrMapping/>
+  </p:clrMapOvr>
+  <p:transition/>
+  <p:timing>
+    <p:tnLst>
+      <p:par>
+        <p:cTn id="1" dur="indefinite" restart="never" nodeType="tmRoot"/>
+      </p:par>
+    </p:tnLst>
+  </p:timing>
+</p:sld>
+</file>
+
+<file path=ppt/slides/slide14.xml><?xml version="1.0" encoding="utf-8"?>
+<p:sld xmlns:a="http://schemas.openxmlformats.org/drawingml/2006/main" xmlns:r="http://schemas.openxmlformats.org/officeDocument/2006/relationships" xmlns:p="http://schemas.openxmlformats.org/presentationml/2006/main">
+  <p:cSld>
+    <p:spTree>
+      <p:nvGrpSpPr>
+        <p:cNvPr id="1" name=""/>
+        <p:cNvGrpSpPr/>
+        <p:nvPr/>
+      </p:nvGrpSpPr>
+      <p:grpSpPr>
+        <a:xfrm>
+          <a:off x="0" y="0"/>
+          <a:ext cx="0" cy="0"/>
+          <a:chOff x="0" y="0"/>
+          <a:chExt cx="0" cy="0"/>
+        </a:xfrm>
+      </p:grpSpPr>
+      <p:sp>
+        <p:nvSpPr>
+          <p:cNvPr id="2" name="Tittel 1"/>
+          <p:cNvSpPr>
+            <a:spLocks noGrp="1"/>
+          </p:cNvSpPr>
+          <p:nvPr>
+            <p:ph type="title"/>
+          </p:nvPr>
+        </p:nvSpPr>
+        <p:spPr/>
+        <p:txBody>
+          <a:bodyPr/>
+          <a:lstStyle/>
+          <a:p>
+            <a:r>
+              <a:rPr lang="en-US" dirty="0" smtClean="0"/>
+              <a:t>Mission type capability</a:t>
+            </a:r>
+            <a:endParaRPr lang="en-US" dirty="0"/>
+          </a:p>
+        </p:txBody>
+      </p:sp>
+      <p:sp>
+        <p:nvSpPr>
+          <p:cNvPr id="7" name="Ellipse 6"/>
+          <p:cNvSpPr/>
+          <p:nvPr/>
+        </p:nvSpPr>
+        <p:spPr>
+          <a:xfrm>
+            <a:off x="-928726" y="1000114"/>
+            <a:ext cx="214314" cy="214314"/>
+          </a:xfrm>
+          <a:prstGeom prst="ellipse">
+            <a:avLst/>
+          </a:prstGeom>
+          <a:solidFill>
+            <a:srgbClr val="C00000"/>
+          </a:solidFill>
+          <a:ln>
+            <a:solidFill>
+              <a:schemeClr val="tx1"/>
+            </a:solidFill>
+          </a:ln>
+        </p:spPr>
+        <p:style>
+          <a:lnRef idx="2">
+            <a:schemeClr val="accent1">
+              <a:shade val="50000"/>
+            </a:schemeClr>
+          </a:lnRef>
+          <a:fillRef idx="1">
+            <a:schemeClr val="accent1"/>
+          </a:fillRef>
+          <a:effectRef idx="0">
+            <a:schemeClr val="accent1"/>
+          </a:effectRef>
+          <a:fontRef idx="minor">
+            <a:schemeClr val="lt1"/>
+          </a:fontRef>
+        </p:style>
+        <p:txBody>
+          <a:bodyPr lIns="0" tIns="0" rIns="0" bIns="0" rtlCol="0" anchor="ctr"/>
+          <a:lstStyle/>
+          <a:p>
+            <a:pPr algn="ctr"/>
+            <a:r>
+              <a:rPr lang="nb-NO" sz="1200" dirty="0" smtClean="0"/>
+              <a:t>A</a:t>
+            </a:r>
+            <a:endParaRPr lang="nb-NO" sz="1200" dirty="0"/>
+          </a:p>
+        </p:txBody>
+      </p:sp>
+      <p:sp>
+        <p:nvSpPr>
+          <p:cNvPr id="8" name="Ellipse 7"/>
+          <p:cNvSpPr/>
+          <p:nvPr/>
+        </p:nvSpPr>
+        <p:spPr>
+          <a:xfrm>
+            <a:off x="-642974" y="1000114"/>
+            <a:ext cx="214314" cy="214314"/>
+          </a:xfrm>
+          <a:prstGeom prst="ellipse">
+            <a:avLst/>
+          </a:prstGeom>
+          <a:solidFill>
+            <a:srgbClr val="C00000"/>
+          </a:solidFill>
+          <a:ln>
+            <a:solidFill>
+              <a:schemeClr val="tx1"/>
+            </a:solidFill>
+          </a:ln>
+        </p:spPr>
+        <p:style>
+          <a:lnRef idx="2">
+            <a:schemeClr val="accent1">
+              <a:shade val="50000"/>
+            </a:schemeClr>
+          </a:lnRef>
+          <a:fillRef idx="1">
+            <a:schemeClr val="accent1"/>
+          </a:fillRef>
+          <a:effectRef idx="0">
+            <a:schemeClr val="accent1"/>
+          </a:effectRef>
+          <a:fontRef idx="minor">
+            <a:schemeClr val="lt1"/>
+          </a:fontRef>
+        </p:style>
+        <p:txBody>
+          <a:bodyPr lIns="0" tIns="0" rIns="0" bIns="0" rtlCol="0" anchor="ctr"/>
+          <a:lstStyle/>
+          <a:p>
+            <a:pPr algn="ctr"/>
+            <a:r>
+              <a:rPr lang="nb-NO" sz="1200" dirty="0" smtClean="0"/>
+              <a:t>A</a:t>
+            </a:r>
+            <a:endParaRPr lang="nb-NO" sz="1200" dirty="0"/>
+          </a:p>
+        </p:txBody>
+      </p:sp>
+      <p:sp>
+        <p:nvSpPr>
+          <p:cNvPr id="9" name="Ellipse 8"/>
+          <p:cNvSpPr/>
+          <p:nvPr/>
+        </p:nvSpPr>
+        <p:spPr>
+          <a:xfrm>
+            <a:off x="-928726" y="1285866"/>
+            <a:ext cx="214314" cy="214314"/>
+          </a:xfrm>
+          <a:prstGeom prst="ellipse">
+            <a:avLst/>
+          </a:prstGeom>
+          <a:solidFill>
+            <a:srgbClr val="C00000"/>
+          </a:solidFill>
+          <a:ln>
+            <a:solidFill>
+              <a:schemeClr val="tx1"/>
+            </a:solidFill>
+          </a:ln>
+        </p:spPr>
+        <p:style>
+          <a:lnRef idx="2">
+            <a:schemeClr val="accent1">
+              <a:shade val="50000"/>
+            </a:schemeClr>
+          </a:lnRef>
+          <a:fillRef idx="1">
+            <a:schemeClr val="accent1"/>
+          </a:fillRef>
+          <a:effectRef idx="0">
+            <a:schemeClr val="accent1"/>
+          </a:effectRef>
+          <a:fontRef idx="minor">
+            <a:schemeClr val="lt1"/>
+          </a:fontRef>
+        </p:style>
+        <p:txBody>
+          <a:bodyPr lIns="0" tIns="0" rIns="0" bIns="0" rtlCol="0" anchor="ctr"/>
+          <a:lstStyle/>
+          <a:p>
+            <a:pPr algn="ctr"/>
+            <a:r>
+              <a:rPr lang="nb-NO" sz="1200" dirty="0" smtClean="0"/>
+              <a:t>B</a:t>
+            </a:r>
+            <a:endParaRPr lang="nb-NO" sz="1200" dirty="0"/>
+          </a:p>
+        </p:txBody>
+      </p:sp>
+      <p:sp>
+        <p:nvSpPr>
+          <p:cNvPr id="10" name="Ellipse 9"/>
+          <p:cNvSpPr/>
+          <p:nvPr/>
+        </p:nvSpPr>
+        <p:spPr>
+          <a:xfrm>
+            <a:off x="-642974" y="1285866"/>
+            <a:ext cx="214314" cy="214314"/>
+          </a:xfrm>
+          <a:prstGeom prst="ellipse">
+            <a:avLst/>
+          </a:prstGeom>
+          <a:solidFill>
+            <a:srgbClr val="C00000"/>
+          </a:solidFill>
+          <a:ln>
+            <a:solidFill>
+              <a:schemeClr val="tx1"/>
+            </a:solidFill>
+          </a:ln>
+        </p:spPr>
+        <p:style>
+          <a:lnRef idx="2">
+            <a:schemeClr val="accent1">
+              <a:shade val="50000"/>
+            </a:schemeClr>
+          </a:lnRef>
+          <a:fillRef idx="1">
+            <a:schemeClr val="accent1"/>
+          </a:fillRef>
+          <a:effectRef idx="0">
+            <a:schemeClr val="accent1"/>
+          </a:effectRef>
+          <a:fontRef idx="minor">
+            <a:schemeClr val="lt1"/>
+          </a:fontRef>
+        </p:style>
+        <p:txBody>
+          <a:bodyPr lIns="0" tIns="0" rIns="0" bIns="0" rtlCol="0" anchor="ctr"/>
+          <a:lstStyle/>
+          <a:p>
+            <a:pPr algn="ctr"/>
+            <a:r>
+              <a:rPr lang="nb-NO" sz="1200" dirty="0" smtClean="0"/>
+              <a:t>B</a:t>
+            </a:r>
+            <a:endParaRPr lang="nb-NO" sz="1200" dirty="0"/>
+          </a:p>
+        </p:txBody>
+      </p:sp>
+      <p:sp>
+        <p:nvSpPr>
+          <p:cNvPr id="11" name="Ellipse 10"/>
+          <p:cNvSpPr/>
+          <p:nvPr/>
+        </p:nvSpPr>
+        <p:spPr>
+          <a:xfrm>
+            <a:off x="-928726" y="1571618"/>
+            <a:ext cx="214314" cy="214314"/>
+          </a:xfrm>
+          <a:prstGeom prst="ellipse">
+            <a:avLst/>
+          </a:prstGeom>
+          <a:solidFill>
+            <a:srgbClr val="C00000"/>
+          </a:solidFill>
+          <a:ln>
+            <a:solidFill>
+              <a:schemeClr val="tx1"/>
+            </a:solidFill>
+          </a:ln>
+        </p:spPr>
+        <p:style>
+          <a:lnRef idx="2">
+            <a:schemeClr val="accent1">
+              <a:shade val="50000"/>
+            </a:schemeClr>
+          </a:lnRef>
+          <a:fillRef idx="1">
+            <a:schemeClr val="accent1"/>
+          </a:fillRef>
+          <a:effectRef idx="0">
+            <a:schemeClr val="accent1"/>
+          </a:effectRef>
+          <a:fontRef idx="minor">
+            <a:schemeClr val="lt1"/>
+          </a:fontRef>
+        </p:style>
+        <p:txBody>
+          <a:bodyPr lIns="0" tIns="0" rIns="0" bIns="0" rtlCol="0" anchor="ctr"/>
+          <a:lstStyle/>
+          <a:p>
+            <a:pPr algn="ctr"/>
+            <a:r>
+              <a:rPr lang="nb-NO" sz="1200" dirty="0" smtClean="0"/>
+              <a:t>C</a:t>
+            </a:r>
+            <a:endParaRPr lang="nb-NO" sz="1200" dirty="0"/>
+          </a:p>
+        </p:txBody>
+      </p:sp>
+      <p:sp>
+        <p:nvSpPr>
+          <p:cNvPr id="12" name="Ellipse 11"/>
+          <p:cNvSpPr/>
+          <p:nvPr/>
+        </p:nvSpPr>
+        <p:spPr>
+          <a:xfrm>
+            <a:off x="-642974" y="1571618"/>
+            <a:ext cx="214314" cy="214314"/>
+          </a:xfrm>
+          <a:prstGeom prst="ellipse">
+            <a:avLst/>
+          </a:prstGeom>
+          <a:solidFill>
+            <a:srgbClr val="C00000"/>
+          </a:solidFill>
+          <a:ln>
+            <a:solidFill>
+              <a:schemeClr val="tx1"/>
+            </a:solidFill>
+          </a:ln>
+        </p:spPr>
+        <p:style>
+          <a:lnRef idx="2">
+            <a:schemeClr val="accent1">
+              <a:shade val="50000"/>
+            </a:schemeClr>
+          </a:lnRef>
+          <a:fillRef idx="1">
+            <a:schemeClr val="accent1"/>
+          </a:fillRef>
+          <a:effectRef idx="0">
+            <a:schemeClr val="accent1"/>
+          </a:effectRef>
+          <a:fontRef idx="minor">
+            <a:schemeClr val="lt1"/>
+          </a:fontRef>
+        </p:style>
+        <p:txBody>
+          <a:bodyPr lIns="0" tIns="0" rIns="0" bIns="0" rtlCol="0" anchor="ctr"/>
+          <a:lstStyle/>
+          <a:p>
+            <a:pPr algn="ctr"/>
+            <a:r>
+              <a:rPr lang="nb-NO" sz="1200" dirty="0" smtClean="0"/>
+              <a:t>C</a:t>
+            </a:r>
+            <a:endParaRPr lang="nb-NO" sz="1200" dirty="0"/>
+          </a:p>
+        </p:txBody>
+      </p:sp>
+      <p:sp>
+        <p:nvSpPr>
+          <p:cNvPr id="13" name="Ellipse 12"/>
+          <p:cNvSpPr/>
+          <p:nvPr/>
+        </p:nvSpPr>
+        <p:spPr>
+          <a:xfrm>
+            <a:off x="-928726" y="1857370"/>
+            <a:ext cx="214314" cy="214314"/>
+          </a:xfrm>
+          <a:prstGeom prst="ellipse">
+            <a:avLst/>
+          </a:prstGeom>
+          <a:solidFill>
+            <a:srgbClr val="C00000"/>
+          </a:solidFill>
+          <a:ln>
+            <a:solidFill>
+              <a:schemeClr val="tx1"/>
+            </a:solidFill>
+          </a:ln>
+        </p:spPr>
+        <p:style>
+          <a:lnRef idx="2">
+            <a:schemeClr val="accent1">
+              <a:shade val="50000"/>
+            </a:schemeClr>
+          </a:lnRef>
+          <a:fillRef idx="1">
+            <a:schemeClr val="accent1"/>
+          </a:fillRef>
+          <a:effectRef idx="0">
+            <a:schemeClr val="accent1"/>
+          </a:effectRef>
+          <a:fontRef idx="minor">
+            <a:schemeClr val="lt1"/>
+          </a:fontRef>
+        </p:style>
+        <p:txBody>
+          <a:bodyPr lIns="0" tIns="0" rIns="0" bIns="0" rtlCol="0" anchor="ctr"/>
+          <a:lstStyle/>
+          <a:p>
+            <a:pPr algn="ctr"/>
+            <a:r>
+              <a:rPr lang="nb-NO" sz="1200" dirty="0" smtClean="0"/>
+              <a:t>D</a:t>
+            </a:r>
+            <a:endParaRPr lang="nb-NO" sz="1200" dirty="0"/>
+          </a:p>
+        </p:txBody>
+      </p:sp>
+      <p:sp>
+        <p:nvSpPr>
+          <p:cNvPr id="14" name="Ellipse 13"/>
+          <p:cNvSpPr/>
+          <p:nvPr/>
+        </p:nvSpPr>
+        <p:spPr>
+          <a:xfrm>
+            <a:off x="-642974" y="1857370"/>
+            <a:ext cx="214314" cy="214314"/>
+          </a:xfrm>
+          <a:prstGeom prst="ellipse">
+            <a:avLst/>
+          </a:prstGeom>
+          <a:solidFill>
+            <a:srgbClr val="C00000"/>
+          </a:solidFill>
+          <a:ln>
+            <a:solidFill>
+              <a:schemeClr val="tx1"/>
+            </a:solidFill>
+          </a:ln>
+        </p:spPr>
+        <p:style>
+          <a:lnRef idx="2">
+            <a:schemeClr val="accent1">
+              <a:shade val="50000"/>
+            </a:schemeClr>
+          </a:lnRef>
+          <a:fillRef idx="1">
+            <a:schemeClr val="accent1"/>
+          </a:fillRef>
+          <a:effectRef idx="0">
+            <a:schemeClr val="accent1"/>
+          </a:effectRef>
+          <a:fontRef idx="minor">
+            <a:schemeClr val="lt1"/>
+          </a:fontRef>
+        </p:style>
+        <p:txBody>
+          <a:bodyPr lIns="0" tIns="0" rIns="0" bIns="0" rtlCol="0" anchor="ctr"/>
+          <a:lstStyle/>
+          <a:p>
+            <a:pPr algn="ctr"/>
+            <a:r>
+              <a:rPr lang="nb-NO" sz="1200" dirty="0" smtClean="0"/>
+              <a:t>D</a:t>
+            </a:r>
+            <a:endParaRPr lang="nb-NO" sz="1200" dirty="0"/>
+          </a:p>
+        </p:txBody>
+      </p:sp>
+      <p:sp>
+        <p:nvSpPr>
+          <p:cNvPr id="15" name="Ellipse 14"/>
+          <p:cNvSpPr/>
+          <p:nvPr/>
+        </p:nvSpPr>
+        <p:spPr>
+          <a:xfrm>
+            <a:off x="-928726" y="2143122"/>
+            <a:ext cx="214314" cy="214314"/>
+          </a:xfrm>
+          <a:prstGeom prst="ellipse">
+            <a:avLst/>
+          </a:prstGeom>
+          <a:solidFill>
+            <a:srgbClr val="C00000"/>
+          </a:solidFill>
+          <a:ln>
+            <a:solidFill>
+              <a:schemeClr val="tx1"/>
+            </a:solidFill>
+          </a:ln>
+        </p:spPr>
+        <p:style>
+          <a:lnRef idx="2">
+            <a:schemeClr val="accent1">
+              <a:shade val="50000"/>
+            </a:schemeClr>
+          </a:lnRef>
+          <a:fillRef idx="1">
+            <a:schemeClr val="accent1"/>
+          </a:fillRef>
+          <a:effectRef idx="0">
+            <a:schemeClr val="accent1"/>
+          </a:effectRef>
+          <a:fontRef idx="minor">
+            <a:schemeClr val="lt1"/>
+          </a:fontRef>
+        </p:style>
+        <p:txBody>
+          <a:bodyPr lIns="0" tIns="0" rIns="0" bIns="0" rtlCol="0" anchor="ctr"/>
+          <a:lstStyle/>
+          <a:p>
+            <a:pPr algn="ctr"/>
+            <a:r>
+              <a:rPr lang="nb-NO" sz="1200" dirty="0" smtClean="0"/>
+              <a:t>E</a:t>
+            </a:r>
+            <a:endParaRPr lang="nb-NO" sz="1200" dirty="0"/>
+          </a:p>
+        </p:txBody>
+      </p:sp>
+      <p:sp>
+        <p:nvSpPr>
+          <p:cNvPr id="16" name="Ellipse 15"/>
+          <p:cNvSpPr/>
+          <p:nvPr/>
+        </p:nvSpPr>
+        <p:spPr>
+          <a:xfrm>
+            <a:off x="-642974" y="2143122"/>
+            <a:ext cx="214314" cy="214314"/>
+          </a:xfrm>
+          <a:prstGeom prst="ellipse">
+            <a:avLst/>
+          </a:prstGeom>
+          <a:solidFill>
+            <a:srgbClr val="C00000"/>
+          </a:solidFill>
+          <a:ln>
+            <a:solidFill>
+              <a:schemeClr val="tx1"/>
+            </a:solidFill>
+          </a:ln>
+        </p:spPr>
+        <p:style>
+          <a:lnRef idx="2">
+            <a:schemeClr val="accent1">
+              <a:shade val="50000"/>
+            </a:schemeClr>
+          </a:lnRef>
+          <a:fillRef idx="1">
+            <a:schemeClr val="accent1"/>
+          </a:fillRef>
+          <a:effectRef idx="0">
+            <a:schemeClr val="accent1"/>
+          </a:effectRef>
+          <a:fontRef idx="minor">
+            <a:schemeClr val="lt1"/>
+          </a:fontRef>
+        </p:style>
+        <p:txBody>
+          <a:bodyPr lIns="0" tIns="0" rIns="0" bIns="0" rtlCol="0" anchor="ctr"/>
+          <a:lstStyle/>
+          <a:p>
+            <a:pPr algn="ctr"/>
+            <a:r>
+              <a:rPr lang="nb-NO" sz="1200" dirty="0" smtClean="0"/>
+              <a:t>E</a:t>
+            </a:r>
+            <a:endParaRPr lang="nb-NO" sz="1200" dirty="0"/>
+          </a:p>
+        </p:txBody>
+      </p:sp>
+      <p:sp>
+        <p:nvSpPr>
+          <p:cNvPr id="17" name="Ellipse 16"/>
+          <p:cNvSpPr/>
+          <p:nvPr/>
+        </p:nvSpPr>
+        <p:spPr>
+          <a:xfrm>
+            <a:off x="-928726" y="2428874"/>
+            <a:ext cx="214314" cy="214314"/>
+          </a:xfrm>
+          <a:prstGeom prst="ellipse">
+            <a:avLst/>
+          </a:prstGeom>
+          <a:solidFill>
+            <a:srgbClr val="C00000"/>
+          </a:solidFill>
+          <a:ln>
+            <a:solidFill>
+              <a:schemeClr val="tx1"/>
+            </a:solidFill>
+          </a:ln>
+        </p:spPr>
+        <p:style>
+          <a:lnRef idx="2">
+            <a:schemeClr val="accent1">
+              <a:shade val="50000"/>
+            </a:schemeClr>
+          </a:lnRef>
+          <a:fillRef idx="1">
+            <a:schemeClr val="accent1"/>
+          </a:fillRef>
+          <a:effectRef idx="0">
+            <a:schemeClr val="accent1"/>
+          </a:effectRef>
+          <a:fontRef idx="minor">
+            <a:schemeClr val="lt1"/>
+          </a:fontRef>
+        </p:style>
+        <p:txBody>
+          <a:bodyPr lIns="0" tIns="0" rIns="0" bIns="0" rtlCol="0" anchor="ctr"/>
+          <a:lstStyle/>
+          <a:p>
+            <a:pPr algn="ctr"/>
+            <a:r>
+              <a:rPr lang="nb-NO" sz="1200" dirty="0" smtClean="0"/>
+              <a:t>F</a:t>
+            </a:r>
+            <a:endParaRPr lang="nb-NO" sz="1200" dirty="0"/>
+          </a:p>
+        </p:txBody>
+      </p:sp>
+      <p:sp>
+        <p:nvSpPr>
+          <p:cNvPr id="18" name="Ellipse 17"/>
+          <p:cNvSpPr/>
+          <p:nvPr/>
+        </p:nvSpPr>
+        <p:spPr>
+          <a:xfrm>
+            <a:off x="-642974" y="2428874"/>
+            <a:ext cx="214314" cy="214314"/>
+          </a:xfrm>
+          <a:prstGeom prst="ellipse">
+            <a:avLst/>
+          </a:prstGeom>
+          <a:solidFill>
+            <a:srgbClr val="C00000"/>
+          </a:solidFill>
+          <a:ln>
+            <a:solidFill>
+              <a:schemeClr val="tx1"/>
+            </a:solidFill>
+          </a:ln>
+        </p:spPr>
+        <p:style>
+          <a:lnRef idx="2">
+            <a:schemeClr val="accent1">
+              <a:shade val="50000"/>
+            </a:schemeClr>
+          </a:lnRef>
+          <a:fillRef idx="1">
+            <a:schemeClr val="accent1"/>
+          </a:fillRef>
+          <a:effectRef idx="0">
+            <a:schemeClr val="accent1"/>
+          </a:effectRef>
+          <a:fontRef idx="minor">
+            <a:schemeClr val="lt1"/>
+          </a:fontRef>
+        </p:style>
+        <p:txBody>
+          <a:bodyPr lIns="0" tIns="0" rIns="0" bIns="0" rtlCol="0" anchor="ctr"/>
+          <a:lstStyle/>
+          <a:p>
+            <a:pPr algn="ctr"/>
+            <a:r>
+              <a:rPr lang="nb-NO" sz="1200" dirty="0" smtClean="0"/>
+              <a:t>F</a:t>
+            </a:r>
+            <a:endParaRPr lang="nb-NO" sz="1200" dirty="0"/>
+          </a:p>
+        </p:txBody>
+      </p:sp>
+      <p:sp>
+        <p:nvSpPr>
+          <p:cNvPr id="19" name="TekstSylinder 18"/>
+          <p:cNvSpPr txBox="1"/>
+          <p:nvPr/>
+        </p:nvSpPr>
+        <p:spPr>
+          <a:xfrm>
+            <a:off x="142844" y="785800"/>
+            <a:ext cx="3214678" cy="4071966"/>
+          </a:xfrm>
+          <a:prstGeom prst="rect">
+            <a:avLst/>
+          </a:prstGeom>
+          <a:solidFill>
+            <a:schemeClr val="accent1">
+              <a:lumMod val="20000"/>
+              <a:lumOff val="80000"/>
+            </a:schemeClr>
+          </a:solidFill>
+          <a:ln>
+            <a:solidFill>
+              <a:schemeClr val="tx1"/>
+            </a:solidFill>
+          </a:ln>
+        </p:spPr>
+        <p:txBody>
+          <a:bodyPr wrap="square" rtlCol="0">
+            <a:normAutofit lnSpcReduction="10000"/>
+          </a:bodyPr>
+          <a:lstStyle/>
+          <a:p>
+            <a:r>
+              <a:rPr lang="en-US" sz="1000" dirty="0" smtClean="0">
+                <a:latin typeface="Arial" pitchFamily="34" charset="0"/>
+                <a:cs typeface="Arial" pitchFamily="34" charset="0"/>
+              </a:rPr>
+              <a:t>Fighter squadrons conduct the following mission sets:</a:t>
+            </a:r>
+          </a:p>
+          <a:p>
+            <a:r>
+              <a:rPr lang="en-US" sz="1000" dirty="0" smtClean="0">
+                <a:latin typeface="Arial" pitchFamily="34" charset="0"/>
+                <a:cs typeface="Arial" pitchFamily="34" charset="0"/>
+              </a:rPr>
+              <a:t>- Sweep</a:t>
+            </a:r>
+          </a:p>
+          <a:p>
+            <a:pPr>
+              <a:buFontTx/>
+              <a:buChar char="-"/>
+            </a:pPr>
+            <a:r>
+              <a:rPr lang="en-US" sz="1000" dirty="0" smtClean="0">
+                <a:latin typeface="Arial" pitchFamily="34" charset="0"/>
+                <a:cs typeface="Arial" pitchFamily="34" charset="0"/>
+              </a:rPr>
+              <a:t>CAP</a:t>
+            </a:r>
+          </a:p>
+          <a:p>
+            <a:pPr>
+              <a:buFontTx/>
+              <a:buChar char="-"/>
+            </a:pPr>
+            <a:r>
+              <a:rPr lang="en-US" sz="1000" dirty="0" smtClean="0">
+                <a:latin typeface="Arial" pitchFamily="34" charset="0"/>
+                <a:cs typeface="Arial" pitchFamily="34" charset="0"/>
+              </a:rPr>
+              <a:t>Limited form of escort</a:t>
+            </a:r>
+          </a:p>
+          <a:p>
+            <a:endParaRPr lang="en-US" sz="1000" dirty="0" smtClean="0">
+              <a:latin typeface="Arial" pitchFamily="34" charset="0"/>
+              <a:cs typeface="Arial" pitchFamily="34" charset="0"/>
+            </a:endParaRPr>
+          </a:p>
+          <a:p>
+            <a:r>
+              <a:rPr lang="en-US" sz="1000" dirty="0" smtClean="0">
+                <a:latin typeface="Arial" pitchFamily="34" charset="0"/>
+                <a:cs typeface="Arial" pitchFamily="34" charset="0"/>
+              </a:rPr>
+              <a:t>Interceptor squadrons are based at airfields and tied to </a:t>
+            </a:r>
+            <a:r>
+              <a:rPr lang="en-US" sz="1000" dirty="0" smtClean="0">
+                <a:latin typeface="Arial" pitchFamily="34" charset="0"/>
+                <a:cs typeface="Arial" pitchFamily="34" charset="0"/>
+              </a:rPr>
+              <a:t>Notian </a:t>
+            </a:r>
+            <a:r>
+              <a:rPr lang="en-US" sz="1000" dirty="0" smtClean="0">
+                <a:latin typeface="Arial" pitchFamily="34" charset="0"/>
+                <a:cs typeface="Arial" pitchFamily="34" charset="0"/>
+              </a:rPr>
+              <a:t>IADS and supports as Quick Reaction Alert flights to protect </a:t>
+            </a:r>
+            <a:r>
+              <a:rPr lang="en-US" sz="1000" dirty="0" smtClean="0">
+                <a:latin typeface="Arial" pitchFamily="34" charset="0"/>
+                <a:cs typeface="Arial" pitchFamily="34" charset="0"/>
+              </a:rPr>
+              <a:t>Notian</a:t>
+            </a:r>
+            <a:r>
+              <a:rPr lang="en-US" sz="1000" dirty="0" smtClean="0">
+                <a:latin typeface="Arial" pitchFamily="34" charset="0"/>
+                <a:cs typeface="Arial" pitchFamily="34" charset="0"/>
+              </a:rPr>
+              <a:t> </a:t>
+            </a:r>
+            <a:r>
+              <a:rPr lang="en-US" sz="1000" dirty="0" smtClean="0">
+                <a:latin typeface="Arial" pitchFamily="34" charset="0"/>
+                <a:cs typeface="Arial" pitchFamily="34" charset="0"/>
+              </a:rPr>
+              <a:t>airfields from attack.</a:t>
+            </a:r>
+          </a:p>
+          <a:p>
+            <a:endParaRPr lang="en-US" sz="1000" dirty="0" smtClean="0">
+              <a:latin typeface="Arial" pitchFamily="34" charset="0"/>
+              <a:cs typeface="Arial" pitchFamily="34" charset="0"/>
+            </a:endParaRPr>
+          </a:p>
+          <a:p>
+            <a:r>
+              <a:rPr lang="en-US" sz="1000" dirty="0" smtClean="0">
+                <a:latin typeface="Arial" pitchFamily="34" charset="0"/>
+                <a:cs typeface="Arial" pitchFamily="34" charset="0"/>
+              </a:rPr>
+              <a:t>Assault Aviation squadrons conduct the following mission sets:</a:t>
+            </a:r>
+          </a:p>
+          <a:p>
+            <a:pPr>
+              <a:buFontTx/>
+              <a:buChar char="-"/>
+            </a:pPr>
+            <a:r>
+              <a:rPr lang="en-US" sz="1000" dirty="0" smtClean="0">
+                <a:latin typeface="Arial" pitchFamily="34" charset="0"/>
+                <a:cs typeface="Arial" pitchFamily="34" charset="0"/>
+              </a:rPr>
+              <a:t>CAS (with ground forces in static positions)</a:t>
+            </a:r>
+          </a:p>
+          <a:p>
+            <a:pPr>
+              <a:buFontTx/>
+              <a:buChar char="-"/>
+            </a:pPr>
+            <a:r>
+              <a:rPr lang="en-US" sz="1000" dirty="0" smtClean="0">
+                <a:latin typeface="Arial" pitchFamily="34" charset="0"/>
+                <a:cs typeface="Arial" pitchFamily="34" charset="0"/>
+              </a:rPr>
+              <a:t>AR</a:t>
+            </a:r>
+          </a:p>
+          <a:p>
+            <a:pPr>
+              <a:buFontTx/>
+              <a:buChar char="-"/>
+            </a:pPr>
+            <a:r>
+              <a:rPr lang="en-US" sz="1000" dirty="0" smtClean="0">
+                <a:latin typeface="Arial" pitchFamily="34" charset="0"/>
+                <a:cs typeface="Arial" pitchFamily="34" charset="0"/>
+              </a:rPr>
+              <a:t>AI</a:t>
+            </a:r>
+          </a:p>
+          <a:p>
+            <a:pPr>
+              <a:buFontTx/>
+              <a:buChar char="-"/>
+            </a:pPr>
+            <a:endParaRPr lang="en-US" sz="1000" dirty="0" smtClean="0">
+              <a:latin typeface="Arial" pitchFamily="34" charset="0"/>
+              <a:cs typeface="Arial" pitchFamily="34" charset="0"/>
+            </a:endParaRPr>
+          </a:p>
+          <a:p>
             <a:pPr>
               <a:buFontTx/>
               <a:buChar char="-"/>
@@ -38579,6 +39717,102 @@
               </a:rPr>
               <a:t>Strikes</a:t>
             </a:r>
+          </a:p>
+          <a:p>
+            <a:pPr>
+              <a:buFontTx/>
+              <a:buChar char="-"/>
+            </a:pPr>
+            <a:endParaRPr lang="en-US" sz="1000" dirty="0" smtClean="0">
+              <a:latin typeface="Arial" pitchFamily="34" charset="0"/>
+              <a:cs typeface="Arial" pitchFamily="34" charset="0"/>
+            </a:endParaRPr>
+          </a:p>
+          <a:p>
+            <a:pPr>
+              <a:buFontTx/>
+              <a:buChar char="-"/>
+            </a:pPr>
+            <a:r>
+              <a:rPr lang="en-US" sz="1000" dirty="0" smtClean="0">
+                <a:latin typeface="Arial" pitchFamily="34" charset="0"/>
+                <a:cs typeface="Arial" pitchFamily="34" charset="0"/>
+              </a:rPr>
+              <a:t>Heavy Bomber Squadrons</a:t>
+            </a:r>
+          </a:p>
+          <a:p>
+            <a:pPr>
+              <a:buFontTx/>
+              <a:buChar char="-"/>
+            </a:pPr>
+            <a:endParaRPr lang="en-US" sz="1000" dirty="0" smtClean="0">
+              <a:latin typeface="Arial" pitchFamily="34" charset="0"/>
+              <a:cs typeface="Arial" pitchFamily="34" charset="0"/>
+            </a:endParaRPr>
+          </a:p>
+          <a:p>
+            <a:pPr>
+              <a:buFontTx/>
+              <a:buChar char="-"/>
+            </a:pPr>
+            <a:r>
+              <a:rPr lang="en-US" sz="1000" dirty="0" smtClean="0">
+                <a:latin typeface="Arial" pitchFamily="34" charset="0"/>
+                <a:cs typeface="Arial" pitchFamily="34" charset="0"/>
+              </a:rPr>
+              <a:t>Naval Fighter Squadrons</a:t>
+            </a:r>
+          </a:p>
+          <a:p>
+            <a:pPr>
+              <a:buFontTx/>
+              <a:buChar char="-"/>
+            </a:pPr>
+            <a:endParaRPr lang="en-US" sz="1000" dirty="0" smtClean="0">
+              <a:latin typeface="Arial" pitchFamily="34" charset="0"/>
+              <a:cs typeface="Arial" pitchFamily="34" charset="0"/>
+            </a:endParaRPr>
+          </a:p>
+          <a:p>
+            <a:pPr>
+              <a:buFontTx/>
+              <a:buChar char="-"/>
+            </a:pPr>
+            <a:r>
+              <a:rPr lang="en-US" sz="1000" dirty="0" smtClean="0">
+                <a:latin typeface="Arial" pitchFamily="34" charset="0"/>
+                <a:cs typeface="Arial" pitchFamily="34" charset="0"/>
+              </a:rPr>
+              <a:t>Maritime Strike Squadrons</a:t>
+            </a:r>
+          </a:p>
+          <a:p>
+            <a:pPr>
+              <a:buFontTx/>
+              <a:buChar char="-"/>
+            </a:pPr>
+            <a:endParaRPr lang="en-US" sz="1000" dirty="0" smtClean="0">
+              <a:latin typeface="Arial" pitchFamily="34" charset="0"/>
+              <a:cs typeface="Arial" pitchFamily="34" charset="0"/>
+            </a:endParaRPr>
+          </a:p>
+          <a:p>
+            <a:pPr>
+              <a:buFontTx/>
+              <a:buChar char="-"/>
+            </a:pPr>
+            <a:r>
+              <a:rPr lang="en-US" sz="1000" dirty="0" smtClean="0">
+                <a:latin typeface="Arial" pitchFamily="34" charset="0"/>
+                <a:cs typeface="Arial" pitchFamily="34" charset="0"/>
+              </a:rPr>
+              <a:t>Maritime Patrol Squadrons</a:t>
+            </a:r>
+            <a:endParaRPr lang="en-US" sz="1000" dirty="0" smtClean="0">
+              <a:latin typeface="Arial" pitchFamily="34" charset="0"/>
+              <a:cs typeface="Arial" pitchFamily="34" charset="0"/>
+            </a:endParaRPr>
           </a:p>
           <a:p>
             <a:endParaRPr lang="en-US" sz="1200" dirty="0" smtClean="0"/>
@@ -38715,52 +39949,6 @@
           </a:effectLst>
         </p:spPr>
       </p:pic>
-      <p:sp>
-        <p:nvSpPr>
-          <p:cNvPr id="21" name="TekstSylinder 20"/>
-          <p:cNvSpPr txBox="1"/>
-          <p:nvPr/>
-        </p:nvSpPr>
-        <p:spPr>
-          <a:xfrm rot="20697024">
-            <a:off x="2706735" y="3136656"/>
-            <a:ext cx="4420315" cy="523220"/>
-          </a:xfrm>
-          <a:prstGeom prst="rect">
-            <a:avLst/>
-          </a:prstGeom>
-          <a:solidFill>
-            <a:schemeClr val="bg1"/>
-          </a:solidFill>
-          <a:ln>
-            <a:solidFill>
-              <a:srgbClr val="FF0000"/>
-            </a:solidFill>
-          </a:ln>
-        </p:spPr>
-        <p:txBody>
-          <a:bodyPr wrap="square" rtlCol="0">
-            <a:spAutoFit/>
-          </a:bodyPr>
-          <a:lstStyle/>
-          <a:p>
-            <a:pPr algn="ctr"/>
-            <a:r>
-              <a:rPr lang="nb-NO" sz="2800" b="1" dirty="0" smtClean="0">
-                <a:solidFill>
-                  <a:srgbClr val="FF0000"/>
-                </a:solidFill>
-              </a:rPr>
-              <a:t>WORK IN PROGRESS</a:t>
-            </a:r>
-            <a:endParaRPr lang="nb-NO" sz="2800" b="1" dirty="0">
-              <a:solidFill>
-                <a:srgbClr val="FF0000"/>
-              </a:solidFill>
-            </a:endParaRPr>
-          </a:p>
-        </p:txBody>
-      </p:sp>
     </p:spTree>
   </p:cSld>
   <p:clrMapOvr>
@@ -38776,7 +39964,7 @@
 </p:sld>
 </file>
 
-<file path=ppt/slides/slide14.xml><?xml version="1.0" encoding="utf-8"?>
+<file path=ppt/slides/slide15.xml><?xml version="1.0" encoding="utf-8"?>
 <p:sld xmlns:a="http://schemas.openxmlformats.org/drawingml/2006/main" xmlns:r="http://schemas.openxmlformats.org/officeDocument/2006/relationships" xmlns:p="http://schemas.openxmlformats.org/presentationml/2006/main" show="0">
   <p:cSld>
     <p:spTree>

</xml_diff>